<commit_message>
binary classification metrics added, minor sql preso updates
</commit_message>
<xml_diff>
--- a/SQL/sql_map.pptx
+++ b/SQL/sql_map.pptx
@@ -22,6 +22,7 @@
     <p:sldId id="269" r:id="rId16"/>
     <p:sldId id="270" r:id="rId17"/>
     <p:sldId id="272" r:id="rId18"/>
+    <p:sldId id="273" r:id="rId19"/>
   </p:sldIdLst>
   <p:sldSz cx="12192000" cy="6858000"/>
   <p:notesSz cx="6858000" cy="9144000"/>
@@ -275,7 +276,7 @@
           <a:p>
             <a:fld id="{FCB9DD6E-BDFF-41CE-9901-CD93B6D20A19}" type="datetimeFigureOut">
               <a:rPr lang="en-US" smtClean="0"/>
-              <a:t>3/26/2020</a:t>
+              <a:t>3/27/2020</a:t>
             </a:fld>
             <a:endParaRPr lang="en-US" dirty="0"/>
           </a:p>
@@ -473,7 +474,7 @@
           <a:p>
             <a:fld id="{FCB9DD6E-BDFF-41CE-9901-CD93B6D20A19}" type="datetimeFigureOut">
               <a:rPr lang="en-US" smtClean="0"/>
-              <a:t>3/26/2020</a:t>
+              <a:t>3/27/2020</a:t>
             </a:fld>
             <a:endParaRPr lang="en-US" dirty="0"/>
           </a:p>
@@ -681,7 +682,7 @@
           <a:p>
             <a:fld id="{FCB9DD6E-BDFF-41CE-9901-CD93B6D20A19}" type="datetimeFigureOut">
               <a:rPr lang="en-US" smtClean="0"/>
-              <a:t>3/26/2020</a:t>
+              <a:t>3/27/2020</a:t>
             </a:fld>
             <a:endParaRPr lang="en-US" dirty="0"/>
           </a:p>
@@ -879,7 +880,7 @@
           <a:p>
             <a:fld id="{FCB9DD6E-BDFF-41CE-9901-CD93B6D20A19}" type="datetimeFigureOut">
               <a:rPr lang="en-US" smtClean="0"/>
-              <a:t>3/26/2020</a:t>
+              <a:t>3/27/2020</a:t>
             </a:fld>
             <a:endParaRPr lang="en-US" dirty="0"/>
           </a:p>
@@ -1154,7 +1155,7 @@
           <a:p>
             <a:fld id="{FCB9DD6E-BDFF-41CE-9901-CD93B6D20A19}" type="datetimeFigureOut">
               <a:rPr lang="en-US" smtClean="0"/>
-              <a:t>3/26/2020</a:t>
+              <a:t>3/27/2020</a:t>
             </a:fld>
             <a:endParaRPr lang="en-US" dirty="0"/>
           </a:p>
@@ -1419,7 +1420,7 @@
           <a:p>
             <a:fld id="{FCB9DD6E-BDFF-41CE-9901-CD93B6D20A19}" type="datetimeFigureOut">
               <a:rPr lang="en-US" smtClean="0"/>
-              <a:t>3/26/2020</a:t>
+              <a:t>3/27/2020</a:t>
             </a:fld>
             <a:endParaRPr lang="en-US" dirty="0"/>
           </a:p>
@@ -1831,7 +1832,7 @@
           <a:p>
             <a:fld id="{FCB9DD6E-BDFF-41CE-9901-CD93B6D20A19}" type="datetimeFigureOut">
               <a:rPr lang="en-US" smtClean="0"/>
-              <a:t>3/26/2020</a:t>
+              <a:t>3/27/2020</a:t>
             </a:fld>
             <a:endParaRPr lang="en-US" dirty="0"/>
           </a:p>
@@ -1972,7 +1973,7 @@
           <a:p>
             <a:fld id="{FCB9DD6E-BDFF-41CE-9901-CD93B6D20A19}" type="datetimeFigureOut">
               <a:rPr lang="en-US" smtClean="0"/>
-              <a:t>3/26/2020</a:t>
+              <a:t>3/27/2020</a:t>
             </a:fld>
             <a:endParaRPr lang="en-US" dirty="0"/>
           </a:p>
@@ -2085,7 +2086,7 @@
           <a:p>
             <a:fld id="{FCB9DD6E-BDFF-41CE-9901-CD93B6D20A19}" type="datetimeFigureOut">
               <a:rPr lang="en-US" smtClean="0"/>
-              <a:t>3/26/2020</a:t>
+              <a:t>3/27/2020</a:t>
             </a:fld>
             <a:endParaRPr lang="en-US" dirty="0"/>
           </a:p>
@@ -2396,7 +2397,7 @@
           <a:p>
             <a:fld id="{FCB9DD6E-BDFF-41CE-9901-CD93B6D20A19}" type="datetimeFigureOut">
               <a:rPr lang="en-US" smtClean="0"/>
-              <a:t>3/26/2020</a:t>
+              <a:t>3/27/2020</a:t>
             </a:fld>
             <a:endParaRPr lang="en-US" dirty="0"/>
           </a:p>
@@ -2684,7 +2685,7 @@
           <a:p>
             <a:fld id="{FCB9DD6E-BDFF-41CE-9901-CD93B6D20A19}" type="datetimeFigureOut">
               <a:rPr lang="en-US" smtClean="0"/>
-              <a:t>3/26/2020</a:t>
+              <a:t>3/27/2020</a:t>
             </a:fld>
             <a:endParaRPr lang="en-US" dirty="0"/>
           </a:p>
@@ -2925,7 +2926,7 @@
           <a:p>
             <a:fld id="{FCB9DD6E-BDFF-41CE-9901-CD93B6D20A19}" type="datetimeFigureOut">
               <a:rPr lang="en-US" smtClean="0"/>
-              <a:t>3/26/2020</a:t>
+              <a:t>3/27/2020</a:t>
             </a:fld>
             <a:endParaRPr lang="en-US" dirty="0"/>
           </a:p>
@@ -12352,6 +12353,967 @@
     <p:extLst>
       <p:ext uri="{BB962C8B-B14F-4D97-AF65-F5344CB8AC3E}">
         <p14:creationId xmlns:p14="http://schemas.microsoft.com/office/powerpoint/2010/main" val="140123833"/>
+      </p:ext>
+    </p:extLst>
+  </p:cSld>
+  <p:clrMapOvr>
+    <a:masterClrMapping/>
+  </p:clrMapOvr>
+</p:sld>
+</file>
+
+<file path=ppt/slides/slide18.xml><?xml version="1.0" encoding="utf-8"?>
+<p:sld xmlns:a="http://schemas.openxmlformats.org/drawingml/2006/main" xmlns:r="http://schemas.openxmlformats.org/officeDocument/2006/relationships" xmlns:p="http://schemas.openxmlformats.org/presentationml/2006/main">
+  <p:cSld>
+    <p:spTree>
+      <p:nvGrpSpPr>
+        <p:cNvPr id="1" name=""/>
+        <p:cNvGrpSpPr/>
+        <p:nvPr/>
+      </p:nvGrpSpPr>
+      <p:grpSpPr>
+        <a:xfrm>
+          <a:off x="0" y="0"/>
+          <a:ext cx="0" cy="0"/>
+          <a:chOff x="0" y="0"/>
+          <a:chExt cx="0" cy="0"/>
+        </a:xfrm>
+      </p:grpSpPr>
+      <p:pic>
+        <p:nvPicPr>
+          <p:cNvPr id="5" name="Picture 4">
+            <a:extLst>
+              <a:ext uri="{FF2B5EF4-FFF2-40B4-BE49-F238E27FC236}">
+                <a16:creationId xmlns:a16="http://schemas.microsoft.com/office/drawing/2014/main" id="{79FF5A85-AEED-4FB3-A1FC-7129FBFC3A7C}"/>
+              </a:ext>
+            </a:extLst>
+          </p:cNvPr>
+          <p:cNvPicPr>
+            <a:picLocks noChangeAspect="1"/>
+          </p:cNvPicPr>
+          <p:nvPr/>
+        </p:nvPicPr>
+        <p:blipFill>
+          <a:blip r:embed="rId2"/>
+          <a:stretch>
+            <a:fillRect/>
+          </a:stretch>
+        </p:blipFill>
+        <p:spPr>
+          <a:xfrm>
+            <a:off x="268533" y="728256"/>
+            <a:ext cx="4867275" cy="2790825"/>
+          </a:xfrm>
+          <a:prstGeom prst="rect">
+            <a:avLst/>
+          </a:prstGeom>
+        </p:spPr>
+      </p:pic>
+      <p:sp>
+        <p:nvSpPr>
+          <p:cNvPr id="4" name="Title 1">
+            <a:extLst>
+              <a:ext uri="{FF2B5EF4-FFF2-40B4-BE49-F238E27FC236}">
+                <a16:creationId xmlns:a16="http://schemas.microsoft.com/office/drawing/2014/main" id="{34206686-79E6-4D1A-AFDC-1B08216F2B2C}"/>
+              </a:ext>
+            </a:extLst>
+          </p:cNvPr>
+          <p:cNvSpPr txBox="1">
+            <a:spLocks/>
+          </p:cNvSpPr>
+          <p:nvPr/>
+        </p:nvSpPr>
+        <p:spPr>
+          <a:xfrm>
+            <a:off x="-1" y="18256"/>
+            <a:ext cx="4854747" cy="565944"/>
+          </a:xfrm>
+          <a:prstGeom prst="rect">
+            <a:avLst/>
+          </a:prstGeom>
+        </p:spPr>
+        <p:txBody>
+          <a:bodyPr vert="horz" lIns="91440" tIns="45720" rIns="91440" bIns="45720" rtlCol="0" anchor="ctr">
+            <a:normAutofit/>
+          </a:bodyPr>
+          <a:lstStyle>
+            <a:lvl1pPr algn="l" defTabSz="914400" rtl="0" eaLnBrk="1" latinLnBrk="0" hangingPunct="1">
+              <a:lnSpc>
+                <a:spcPct val="90000"/>
+              </a:lnSpc>
+              <a:spcBef>
+                <a:spcPct val="0"/>
+              </a:spcBef>
+              <a:buNone/>
+              <a:defRPr sz="4400" kern="1200">
+                <a:solidFill>
+                  <a:schemeClr val="tx1"/>
+                </a:solidFill>
+                <a:latin typeface="+mj-lt"/>
+                <a:ea typeface="+mj-ea"/>
+                <a:cs typeface="+mj-cs"/>
+              </a:defRPr>
+            </a:lvl1pPr>
+          </a:lstStyle>
+          <a:p>
+            <a:r>
+              <a:rPr lang="en-US" sz="3200" b="1" i="1" dirty="0">
+                <a:latin typeface="+mn-lt"/>
+              </a:rPr>
+              <a:t>EXAMPLES</a:t>
+            </a:r>
+          </a:p>
+        </p:txBody>
+      </p:sp>
+      <p:grpSp>
+        <p:nvGrpSpPr>
+          <p:cNvPr id="11" name="Group 10">
+            <a:extLst>
+              <a:ext uri="{FF2B5EF4-FFF2-40B4-BE49-F238E27FC236}">
+                <a16:creationId xmlns:a16="http://schemas.microsoft.com/office/drawing/2014/main" id="{A5A2674D-AD72-4B99-95B8-C4B95537B4DA}"/>
+              </a:ext>
+            </a:extLst>
+          </p:cNvPr>
+          <p:cNvGrpSpPr/>
+          <p:nvPr/>
+        </p:nvGrpSpPr>
+        <p:grpSpPr>
+          <a:xfrm>
+            <a:off x="184558" y="706352"/>
+            <a:ext cx="6132353" cy="4611634"/>
+            <a:chOff x="142613" y="584200"/>
+            <a:chExt cx="6132353" cy="3934300"/>
+          </a:xfrm>
+        </p:grpSpPr>
+        <p:sp>
+          <p:nvSpPr>
+            <p:cNvPr id="6" name="Rectangle 5">
+              <a:extLst>
+                <a:ext uri="{FF2B5EF4-FFF2-40B4-BE49-F238E27FC236}">
+                  <a16:creationId xmlns:a16="http://schemas.microsoft.com/office/drawing/2014/main" id="{F61AD472-0FBE-4D69-9E1A-2F09B38D8F33}"/>
+                </a:ext>
+              </a:extLst>
+            </p:cNvPr>
+            <p:cNvSpPr/>
+            <p:nvPr/>
+          </p:nvSpPr>
+          <p:spPr>
+            <a:xfrm>
+              <a:off x="142614" y="2891260"/>
+              <a:ext cx="6132352" cy="1541685"/>
+            </a:xfrm>
+            <a:prstGeom prst="rect">
+              <a:avLst/>
+            </a:prstGeom>
+            <a:ln>
+              <a:noFill/>
+            </a:ln>
+          </p:spPr>
+          <p:txBody>
+            <a:bodyPr wrap="square" numCol="3" spcCol="91440" anchor="b">
+              <a:normAutofit/>
+            </a:bodyPr>
+            <a:lstStyle/>
+            <a:p>
+              <a:r>
+                <a:rPr lang="en-US" sz="1400" dirty="0">
+                  <a:solidFill>
+                    <a:srgbClr val="333333"/>
+                  </a:solidFill>
+                </a:rPr>
+                <a:t>Over budget on a project is defined when the salaries, prorated to the day, exceed the budget of the project.</a:t>
+              </a:r>
+            </a:p>
+            <a:p>
+              <a:r>
+                <a:rPr lang="en-US" sz="1400" dirty="0">
+                  <a:solidFill>
+                    <a:srgbClr val="333333"/>
+                  </a:solidFill>
+                </a:rPr>
+                <a:t> </a:t>
+              </a:r>
+            </a:p>
+            <a:p>
+              <a:r>
+                <a:rPr lang="en-US" sz="1400" dirty="0">
+                  <a:solidFill>
+                    <a:srgbClr val="333333"/>
+                  </a:solidFill>
+                </a:rPr>
+                <a:t>For example, if Alice and Bob both combined income make 200K and work on a project of a budget of 50K that takes half a year, then the project is over budget given 0.5 * 200K = 100K &gt; 50K. </a:t>
+              </a:r>
+            </a:p>
+            <a:p>
+              <a:endParaRPr lang="en-US" sz="1400" dirty="0">
+                <a:solidFill>
+                  <a:srgbClr val="333333"/>
+                </a:solidFill>
+              </a:endParaRPr>
+            </a:p>
+            <a:p>
+              <a:r>
+                <a:rPr lang="en-US" sz="1400" dirty="0">
+                  <a:solidFill>
+                    <a:srgbClr val="333333"/>
+                  </a:solidFill>
+                </a:rPr>
+                <a:t>Write a query to select all projects that are over budget. Assume that employees only work on one project at a time.</a:t>
+              </a:r>
+              <a:endParaRPr lang="en-US" sz="1400" dirty="0"/>
+            </a:p>
+          </p:txBody>
+        </p:sp>
+        <p:sp>
+          <p:nvSpPr>
+            <p:cNvPr id="10" name="Rectangle 9">
+              <a:extLst>
+                <a:ext uri="{FF2B5EF4-FFF2-40B4-BE49-F238E27FC236}">
+                  <a16:creationId xmlns:a16="http://schemas.microsoft.com/office/drawing/2014/main" id="{613FCF3A-D373-44CE-B3FD-ED391B2BCBF7}"/>
+                </a:ext>
+              </a:extLst>
+            </p:cNvPr>
+            <p:cNvSpPr/>
+            <p:nvPr/>
+          </p:nvSpPr>
+          <p:spPr>
+            <a:xfrm>
+              <a:off x="142613" y="584200"/>
+              <a:ext cx="6132352" cy="3934300"/>
+            </a:xfrm>
+            <a:prstGeom prst="rect">
+              <a:avLst/>
+            </a:prstGeom>
+            <a:noFill/>
+          </p:spPr>
+          <p:style>
+            <a:lnRef idx="2">
+              <a:schemeClr val="accent1">
+                <a:shade val="50000"/>
+              </a:schemeClr>
+            </a:lnRef>
+            <a:fillRef idx="1">
+              <a:schemeClr val="accent1"/>
+            </a:fillRef>
+            <a:effectRef idx="0">
+              <a:schemeClr val="accent1"/>
+            </a:effectRef>
+            <a:fontRef idx="minor">
+              <a:schemeClr val="lt1"/>
+            </a:fontRef>
+          </p:style>
+          <p:txBody>
+            <a:bodyPr rtlCol="0" anchor="ctr"/>
+            <a:lstStyle/>
+            <a:p>
+              <a:pPr algn="ctr"/>
+              <a:endParaRPr lang="en-US"/>
+            </a:p>
+          </p:txBody>
+        </p:sp>
+      </p:grpSp>
+      <p:sp>
+        <p:nvSpPr>
+          <p:cNvPr id="2" name="Rectangle 1">
+            <a:extLst>
+              <a:ext uri="{FF2B5EF4-FFF2-40B4-BE49-F238E27FC236}">
+                <a16:creationId xmlns:a16="http://schemas.microsoft.com/office/drawing/2014/main" id="{74826DE3-CE86-4439-8F96-070C137ECEE8}"/>
+              </a:ext>
+            </a:extLst>
+          </p:cNvPr>
+          <p:cNvSpPr/>
+          <p:nvPr/>
+        </p:nvSpPr>
+        <p:spPr>
+          <a:xfrm>
+            <a:off x="184558" y="5440138"/>
+            <a:ext cx="11206253" cy="1323439"/>
+          </a:xfrm>
+          <a:prstGeom prst="rect">
+            <a:avLst/>
+          </a:prstGeom>
+        </p:spPr>
+        <p:style>
+          <a:lnRef idx="2">
+            <a:schemeClr val="accent6"/>
+          </a:lnRef>
+          <a:fillRef idx="1">
+            <a:schemeClr val="lt1"/>
+          </a:fillRef>
+          <a:effectRef idx="0">
+            <a:schemeClr val="accent6"/>
+          </a:effectRef>
+          <a:fontRef idx="minor">
+            <a:schemeClr val="dk1"/>
+          </a:fontRef>
+        </p:style>
+        <p:txBody>
+          <a:bodyPr wrap="square">
+            <a:spAutoFit/>
+          </a:bodyPr>
+          <a:lstStyle/>
+          <a:p>
+            <a:r>
+              <a:rPr lang="en-US" sz="1600" dirty="0"/>
+              <a:t>Notice how we're left joining `projects` to both `</a:t>
+            </a:r>
+            <a:r>
+              <a:rPr lang="en-US" sz="1600" dirty="0" err="1"/>
+              <a:t>employee_projects</a:t>
+            </a:r>
+            <a:r>
+              <a:rPr lang="en-US" sz="1600" dirty="0"/>
+              <a:t>` and `employees`. This is due to the effect that if there exists no employees on a project, we still need to define it as overbudget and setting the salaries as 0. </a:t>
+            </a:r>
+          </a:p>
+          <a:p>
+            <a:endParaRPr lang="en-US" sz="1600" dirty="0"/>
+          </a:p>
+          <a:p>
+            <a:r>
+              <a:rPr lang="en-US" sz="1600" dirty="0"/>
+              <a:t>We're also grouping by title, </a:t>
+            </a:r>
+            <a:r>
+              <a:rPr lang="en-US" sz="1600" dirty="0" err="1"/>
+              <a:t>project_days</a:t>
+            </a:r>
+            <a:r>
+              <a:rPr lang="en-US" sz="1600" dirty="0"/>
+              <a:t>, and budget, so that we can get the total sum. Given that each of title, </a:t>
+            </a:r>
+            <a:r>
+              <a:rPr lang="en-US" sz="1600" dirty="0" err="1"/>
+              <a:t>project_days</a:t>
+            </a:r>
+            <a:r>
+              <a:rPr lang="en-US" sz="1600" dirty="0"/>
+              <a:t>, and budget are distinct for each project, we can do the group by without a fear of duplication in our SUM.</a:t>
+            </a:r>
+          </a:p>
+        </p:txBody>
+      </p:sp>
+      <p:sp>
+        <p:nvSpPr>
+          <p:cNvPr id="3" name="Rectangle 1">
+            <a:extLst>
+              <a:ext uri="{FF2B5EF4-FFF2-40B4-BE49-F238E27FC236}">
+                <a16:creationId xmlns:a16="http://schemas.microsoft.com/office/drawing/2014/main" id="{6A9EF491-3ADA-40D2-98FF-097BF9E14816}"/>
+              </a:ext>
+            </a:extLst>
+          </p:cNvPr>
+          <p:cNvSpPr>
+            <a:spLocks noChangeArrowheads="1"/>
+          </p:cNvSpPr>
+          <p:nvPr/>
+        </p:nvSpPr>
+        <p:spPr bwMode="auto">
+          <a:xfrm>
+            <a:off x="6463123" y="301228"/>
+            <a:ext cx="5634941" cy="5016758"/>
+          </a:xfrm>
+          <a:prstGeom prst="rect">
+            <a:avLst/>
+          </a:prstGeom>
+          <a:solidFill>
+            <a:schemeClr val="accent4">
+              <a:lumMod val="20000"/>
+              <a:lumOff val="80000"/>
+            </a:schemeClr>
+          </a:solidFill>
+          <a:ln>
+            <a:noFill/>
+          </a:ln>
+          <a:effectLst/>
+        </p:spPr>
+        <p:txBody>
+          <a:bodyPr vert="horz" wrap="none" lIns="91440" tIns="45720" rIns="91440" bIns="45720" numCol="1" anchor="ctr" anchorCtr="0" compatLnSpc="1">
+            <a:prstTxWarp prst="textNoShape">
+              <a:avLst/>
+            </a:prstTxWarp>
+            <a:spAutoFit/>
+          </a:bodyPr>
+          <a:lstStyle/>
+          <a:p>
+            <a:pPr marL="0" marR="0" lvl="0" indent="0" algn="l" defTabSz="914400" rtl="0" eaLnBrk="0" fontAlgn="base" latinLnBrk="0" hangingPunct="0">
+              <a:lnSpc>
+                <a:spcPct val="100000"/>
+              </a:lnSpc>
+              <a:spcBef>
+                <a:spcPct val="0"/>
+              </a:spcBef>
+              <a:spcAft>
+                <a:spcPct val="0"/>
+              </a:spcAft>
+              <a:buClrTx/>
+              <a:buSzTx/>
+              <a:buFontTx/>
+              <a:buNone/>
+              <a:tabLst/>
+            </a:pPr>
+            <a:r>
+              <a:rPr lang="en-US" altLang="en-US" sz="1600" dirty="0">
+                <a:solidFill>
+                  <a:srgbClr val="FF0066"/>
+                </a:solidFill>
+              </a:rPr>
+              <a:t>SELECT</a:t>
+            </a:r>
+            <a:r>
+              <a:rPr lang="en-US" altLang="en-US" sz="1600" dirty="0"/>
+              <a:t> </a:t>
+            </a:r>
+            <a:br>
+              <a:rPr lang="en-US" altLang="en-US" sz="1600" dirty="0"/>
+            </a:br>
+            <a:r>
+              <a:rPr lang="en-US" altLang="en-US" sz="1600" dirty="0"/>
+              <a:t>    title,</a:t>
+            </a:r>
+            <a:br>
+              <a:rPr lang="en-US" altLang="en-US" sz="1600" dirty="0"/>
+            </a:br>
+            <a:r>
+              <a:rPr lang="en-US" altLang="en-US" sz="1600" dirty="0"/>
+              <a:t>    </a:t>
+            </a:r>
+            <a:r>
+              <a:rPr lang="en-US" altLang="en-US" sz="1600" dirty="0">
+                <a:solidFill>
+                  <a:srgbClr val="FF0066"/>
+                </a:solidFill>
+              </a:rPr>
+              <a:t>CASE</a:t>
+            </a:r>
+            <a:r>
+              <a:rPr lang="en-US" altLang="en-US" sz="1600" dirty="0"/>
+              <a:t> </a:t>
+            </a:r>
+            <a:r>
+              <a:rPr lang="en-US" altLang="en-US" sz="1600" dirty="0">
+                <a:solidFill>
+                  <a:srgbClr val="FF0066"/>
+                </a:solidFill>
+              </a:rPr>
+              <a:t>WHEN</a:t>
+            </a:r>
+            <a:r>
+              <a:rPr lang="en-US" altLang="en-US" sz="1600" dirty="0"/>
+              <a:t> </a:t>
+            </a:r>
+            <a:br>
+              <a:rPr lang="en-US" altLang="en-US" sz="1600" dirty="0"/>
+            </a:br>
+            <a:r>
+              <a:rPr lang="en-US" altLang="en-US" sz="1600" dirty="0"/>
+              <a:t>        </a:t>
+            </a:r>
+            <a:r>
+              <a:rPr lang="en-US" altLang="en-US" sz="1600" dirty="0">
+                <a:solidFill>
+                  <a:srgbClr val="FF0066"/>
+                </a:solidFill>
+              </a:rPr>
+              <a:t>CAST</a:t>
+            </a:r>
+            <a:r>
+              <a:rPr lang="en-US" altLang="en-US" sz="1600" dirty="0"/>
+              <a:t>(</a:t>
+            </a:r>
+            <a:r>
+              <a:rPr lang="en-US" altLang="en-US" sz="1600" dirty="0" err="1"/>
+              <a:t>project_days</a:t>
+            </a:r>
+            <a:r>
+              <a:rPr lang="en-US" altLang="en-US" sz="1600" dirty="0"/>
+              <a:t> </a:t>
+            </a:r>
+            <a:r>
+              <a:rPr lang="en-US" altLang="en-US" sz="1600" dirty="0">
+                <a:solidFill>
+                  <a:srgbClr val="FF0066"/>
+                </a:solidFill>
+              </a:rPr>
+              <a:t>AS</a:t>
+            </a:r>
+            <a:r>
+              <a:rPr lang="en-US" altLang="en-US" sz="1600" dirty="0"/>
+              <a:t> </a:t>
+            </a:r>
+            <a:r>
+              <a:rPr lang="en-US" altLang="en-US" sz="1600" dirty="0">
+                <a:solidFill>
+                  <a:srgbClr val="FF0066"/>
+                </a:solidFill>
+              </a:rPr>
+              <a:t>DECIMAL</a:t>
+            </a:r>
+            <a:r>
+              <a:rPr lang="en-US" altLang="en-US" sz="1600" dirty="0"/>
+              <a:t>)/365 * </a:t>
+            </a:r>
+            <a:r>
+              <a:rPr lang="en-US" altLang="en-US" sz="1600" dirty="0" err="1"/>
+              <a:t>total_salary</a:t>
+            </a:r>
+            <a:r>
+              <a:rPr lang="en-US" altLang="en-US" sz="1600" dirty="0"/>
+              <a:t> &gt; budget </a:t>
+            </a:r>
+            <a:br>
+              <a:rPr lang="en-US" altLang="en-US" sz="1600" dirty="0"/>
+            </a:br>
+            <a:r>
+              <a:rPr lang="en-US" altLang="en-US" sz="1600" dirty="0"/>
+              <a:t>        </a:t>
+            </a:r>
+            <a:r>
+              <a:rPr lang="en-US" altLang="en-US" sz="1600" dirty="0">
+                <a:solidFill>
+                  <a:srgbClr val="FF0066"/>
+                </a:solidFill>
+              </a:rPr>
+              <a:t>THEN</a:t>
+            </a:r>
+            <a:r>
+              <a:rPr lang="en-US" altLang="en-US" sz="1600" dirty="0"/>
+              <a:t> 'overbudget’ </a:t>
+            </a:r>
+          </a:p>
+          <a:p>
+            <a:pPr marL="0" marR="0" lvl="0" indent="0" algn="l" defTabSz="914400" rtl="0" eaLnBrk="0" fontAlgn="base" latinLnBrk="0" hangingPunct="0">
+              <a:lnSpc>
+                <a:spcPct val="100000"/>
+              </a:lnSpc>
+              <a:spcBef>
+                <a:spcPct val="0"/>
+              </a:spcBef>
+              <a:spcAft>
+                <a:spcPct val="0"/>
+              </a:spcAft>
+              <a:buClrTx/>
+              <a:buSzTx/>
+              <a:buFontTx/>
+              <a:buNone/>
+              <a:tabLst/>
+            </a:pPr>
+            <a:r>
+              <a:rPr lang="en-US" altLang="en-US" sz="1600" dirty="0">
+                <a:solidFill>
+                  <a:srgbClr val="FF0066"/>
+                </a:solidFill>
+              </a:rPr>
+              <a:t>        ELSE</a:t>
+            </a:r>
+            <a:r>
+              <a:rPr lang="en-US" altLang="en-US" sz="1600" dirty="0"/>
+              <a:t> 'within budget' </a:t>
+            </a:r>
+            <a:br>
+              <a:rPr lang="en-US" altLang="en-US" sz="1600" dirty="0"/>
+            </a:br>
+            <a:r>
+              <a:rPr lang="en-US" altLang="en-US" sz="1600" dirty="0"/>
+              <a:t>    </a:t>
+            </a:r>
+            <a:r>
+              <a:rPr lang="en-US" altLang="en-US" sz="1600" dirty="0">
+                <a:solidFill>
+                  <a:srgbClr val="FF0066"/>
+                </a:solidFill>
+              </a:rPr>
+              <a:t>END</a:t>
+            </a:r>
+            <a:r>
+              <a:rPr lang="en-US" altLang="en-US" sz="1600" dirty="0"/>
+              <a:t> </a:t>
+            </a:r>
+            <a:r>
+              <a:rPr lang="en-US" altLang="en-US" sz="1600" dirty="0">
+                <a:solidFill>
+                  <a:srgbClr val="FF0066"/>
+                </a:solidFill>
+              </a:rPr>
+              <a:t>AS</a:t>
+            </a:r>
+            <a:r>
+              <a:rPr lang="en-US" altLang="en-US" sz="1600" dirty="0"/>
+              <a:t> </a:t>
+            </a:r>
+            <a:r>
+              <a:rPr lang="en-US" altLang="en-US" sz="1600" dirty="0" err="1"/>
+              <a:t>project_forecast</a:t>
+            </a:r>
+            <a:br>
+              <a:rPr lang="en-US" altLang="en-US" sz="1600" dirty="0"/>
+            </a:br>
+            <a:r>
+              <a:rPr lang="en-US" altLang="en-US" sz="1600" dirty="0">
+                <a:solidFill>
+                  <a:srgbClr val="FF0066"/>
+                </a:solidFill>
+              </a:rPr>
+              <a:t>FROM</a:t>
+            </a:r>
+            <a:r>
+              <a:rPr lang="en-US" altLang="en-US" sz="1600" dirty="0"/>
+              <a:t> (</a:t>
+            </a:r>
+            <a:br>
+              <a:rPr lang="en-US" altLang="en-US" sz="1600" dirty="0"/>
+            </a:br>
+            <a:r>
+              <a:rPr lang="en-US" altLang="en-US" sz="1600" dirty="0"/>
+              <a:t>    </a:t>
+            </a:r>
+            <a:r>
+              <a:rPr lang="en-US" altLang="en-US" sz="1600" dirty="0">
+                <a:solidFill>
+                  <a:srgbClr val="FF0066"/>
+                </a:solidFill>
+              </a:rPr>
+              <a:t>SELECT</a:t>
+            </a:r>
+            <a:r>
+              <a:rPr lang="en-US" altLang="en-US" sz="1600" dirty="0"/>
+              <a:t> </a:t>
+            </a:r>
+            <a:br>
+              <a:rPr lang="en-US" altLang="en-US" sz="1600" dirty="0"/>
+            </a:br>
+            <a:r>
+              <a:rPr lang="en-US" altLang="en-US" sz="1600" dirty="0"/>
+              <a:t>        title,</a:t>
+            </a:r>
+            <a:br>
+              <a:rPr lang="en-US" altLang="en-US" sz="1600" dirty="0"/>
+            </a:br>
+            <a:r>
+              <a:rPr lang="en-US" altLang="en-US" sz="1600" dirty="0"/>
+              <a:t>        </a:t>
+            </a:r>
+            <a:r>
+              <a:rPr lang="en-US" altLang="en-US" sz="1600" dirty="0">
+                <a:solidFill>
+                  <a:srgbClr val="FF0066"/>
+                </a:solidFill>
+              </a:rPr>
+              <a:t>DATEDIFF</a:t>
+            </a:r>
+            <a:r>
+              <a:rPr lang="en-US" altLang="en-US" sz="1600" dirty="0"/>
+              <a:t>(</a:t>
+            </a:r>
+            <a:r>
+              <a:rPr lang="en-US" altLang="en-US" sz="1600" dirty="0" err="1"/>
+              <a:t>end_date</a:t>
+            </a:r>
+            <a:r>
+              <a:rPr lang="en-US" altLang="en-US" sz="1600" dirty="0"/>
+              <a:t>, </a:t>
+            </a:r>
+            <a:r>
+              <a:rPr lang="en-US" altLang="en-US" sz="1600" dirty="0" err="1"/>
+              <a:t>start_date</a:t>
+            </a:r>
+            <a:r>
+              <a:rPr lang="en-US" altLang="en-US" sz="1600" dirty="0"/>
+              <a:t>) </a:t>
+            </a:r>
+            <a:r>
+              <a:rPr lang="en-US" altLang="en-US" sz="1600" dirty="0">
+                <a:solidFill>
+                  <a:srgbClr val="FF0066"/>
+                </a:solidFill>
+              </a:rPr>
+              <a:t>AS</a:t>
+            </a:r>
+            <a:r>
+              <a:rPr lang="en-US" altLang="en-US" sz="1600" dirty="0"/>
+              <a:t> </a:t>
+            </a:r>
+            <a:r>
+              <a:rPr lang="en-US" altLang="en-US" sz="1600" dirty="0" err="1"/>
+              <a:t>project_days</a:t>
+            </a:r>
+            <a:r>
+              <a:rPr lang="en-US" altLang="en-US" sz="1600" dirty="0"/>
+              <a:t>,</a:t>
+            </a:r>
+            <a:br>
+              <a:rPr lang="en-US" altLang="en-US" sz="1600" dirty="0"/>
+            </a:br>
+            <a:r>
+              <a:rPr lang="en-US" altLang="en-US" sz="1600" dirty="0"/>
+              <a:t>        budget,</a:t>
+            </a:r>
+            <a:br>
+              <a:rPr lang="en-US" altLang="en-US" sz="1600" dirty="0"/>
+            </a:br>
+            <a:r>
+              <a:rPr lang="en-US" altLang="en-US" sz="1600" dirty="0"/>
+              <a:t>        </a:t>
+            </a:r>
+            <a:r>
+              <a:rPr lang="en-US" altLang="en-US" sz="1600" dirty="0">
+                <a:solidFill>
+                  <a:srgbClr val="FF0066"/>
+                </a:solidFill>
+              </a:rPr>
+              <a:t>SUM</a:t>
+            </a:r>
+            <a:r>
+              <a:rPr lang="en-US" altLang="en-US" sz="1600" dirty="0"/>
+              <a:t>(</a:t>
+            </a:r>
+            <a:r>
+              <a:rPr lang="en-US" altLang="en-US" sz="1600" dirty="0">
+                <a:solidFill>
+                  <a:srgbClr val="FF0066"/>
+                </a:solidFill>
+              </a:rPr>
+              <a:t>COALESCE</a:t>
+            </a:r>
+            <a:r>
+              <a:rPr lang="en-US" altLang="en-US" sz="1600" dirty="0"/>
+              <a:t>(salary,0)) </a:t>
+            </a:r>
+            <a:r>
+              <a:rPr lang="en-US" altLang="en-US" sz="1600" dirty="0">
+                <a:solidFill>
+                  <a:srgbClr val="FF0066"/>
+                </a:solidFill>
+              </a:rPr>
+              <a:t>AS</a:t>
+            </a:r>
+            <a:r>
+              <a:rPr lang="en-US" altLang="en-US" sz="1600" dirty="0"/>
+              <a:t> </a:t>
+            </a:r>
+            <a:r>
+              <a:rPr lang="en-US" altLang="en-US" sz="1600" dirty="0" err="1"/>
+              <a:t>total_salary</a:t>
+            </a:r>
+            <a:r>
+              <a:rPr lang="en-US" altLang="en-US" sz="1600" dirty="0"/>
+              <a:t>,</a:t>
+            </a:r>
+            <a:br>
+              <a:rPr lang="en-US" altLang="en-US" sz="1600" dirty="0"/>
+            </a:br>
+            <a:r>
+              <a:rPr lang="en-US" altLang="en-US" sz="1600" dirty="0"/>
+              <a:t>    </a:t>
+            </a:r>
+            <a:r>
+              <a:rPr lang="en-US" altLang="en-US" sz="1600" dirty="0">
+                <a:solidFill>
+                  <a:srgbClr val="FF0066"/>
+                </a:solidFill>
+              </a:rPr>
+              <a:t>FROM</a:t>
+            </a:r>
+            <a:r>
+              <a:rPr lang="en-US" altLang="en-US" sz="1600" dirty="0"/>
+              <a:t> projects </a:t>
+            </a:r>
+            <a:r>
+              <a:rPr lang="en-US" altLang="en-US" sz="1600" dirty="0">
+                <a:solidFill>
+                  <a:srgbClr val="FF0066"/>
+                </a:solidFill>
+              </a:rPr>
+              <a:t>AS</a:t>
+            </a:r>
+            <a:r>
+              <a:rPr lang="en-US" altLang="en-US" sz="1600" dirty="0"/>
+              <a:t> p</a:t>
+            </a:r>
+            <a:br>
+              <a:rPr lang="en-US" altLang="en-US" sz="1600" dirty="0"/>
+            </a:br>
+            <a:r>
+              <a:rPr lang="en-US" altLang="en-US" sz="1600" dirty="0"/>
+              <a:t>    </a:t>
+            </a:r>
+            <a:r>
+              <a:rPr lang="en-US" altLang="en-US" sz="1600" dirty="0">
+                <a:solidFill>
+                  <a:srgbClr val="FF0066"/>
+                </a:solidFill>
+              </a:rPr>
+              <a:t>LEFT</a:t>
+            </a:r>
+            <a:r>
+              <a:rPr lang="en-US" altLang="en-US" sz="1600" dirty="0"/>
+              <a:t> </a:t>
+            </a:r>
+            <a:r>
+              <a:rPr lang="en-US" altLang="en-US" sz="1600" dirty="0">
+                <a:solidFill>
+                  <a:srgbClr val="FF0066"/>
+                </a:solidFill>
+              </a:rPr>
+              <a:t>JOIN</a:t>
+            </a:r>
+            <a:r>
+              <a:rPr lang="en-US" altLang="en-US" sz="1600" dirty="0"/>
+              <a:t> </a:t>
+            </a:r>
+            <a:r>
+              <a:rPr lang="en-US" altLang="en-US" sz="1600" dirty="0" err="1"/>
+              <a:t>employees_projects</a:t>
+            </a:r>
+            <a:r>
+              <a:rPr lang="en-US" altLang="en-US" sz="1600" dirty="0"/>
+              <a:t> </a:t>
+            </a:r>
+            <a:r>
+              <a:rPr lang="en-US" altLang="en-US" sz="1600" dirty="0">
+                <a:solidFill>
+                  <a:srgbClr val="FF0066"/>
+                </a:solidFill>
+              </a:rPr>
+              <a:t>AS</a:t>
+            </a:r>
+            <a:r>
+              <a:rPr lang="en-US" altLang="en-US" sz="1600" dirty="0"/>
+              <a:t> ep</a:t>
+            </a:r>
+            <a:br>
+              <a:rPr lang="en-US" altLang="en-US" sz="1600" dirty="0"/>
+            </a:br>
+            <a:r>
+              <a:rPr lang="en-US" altLang="en-US" sz="1600" dirty="0"/>
+              <a:t>        </a:t>
+            </a:r>
+            <a:r>
+              <a:rPr lang="en-US" altLang="en-US" sz="1600" dirty="0">
+                <a:solidFill>
+                  <a:srgbClr val="FF0066"/>
+                </a:solidFill>
+              </a:rPr>
+              <a:t>ON</a:t>
+            </a:r>
+            <a:r>
+              <a:rPr lang="en-US" altLang="en-US" sz="1600" dirty="0"/>
+              <a:t> p.id = </a:t>
+            </a:r>
+            <a:r>
+              <a:rPr lang="en-US" altLang="en-US" sz="1600" dirty="0" err="1"/>
+              <a:t>ep.project_id</a:t>
+            </a:r>
+            <a:br>
+              <a:rPr lang="en-US" altLang="en-US" sz="1600" dirty="0"/>
+            </a:br>
+            <a:r>
+              <a:rPr lang="en-US" altLang="en-US" sz="1600" dirty="0"/>
+              <a:t>    </a:t>
+            </a:r>
+            <a:r>
+              <a:rPr lang="en-US" altLang="en-US" sz="1600" dirty="0">
+                <a:solidFill>
+                  <a:srgbClr val="FF0066"/>
+                </a:solidFill>
+              </a:rPr>
+              <a:t>LEFT</a:t>
+            </a:r>
+            <a:r>
+              <a:rPr lang="en-US" altLang="en-US" sz="1600" dirty="0"/>
+              <a:t> </a:t>
+            </a:r>
+            <a:r>
+              <a:rPr lang="en-US" altLang="en-US" sz="1600" dirty="0">
+                <a:solidFill>
+                  <a:srgbClr val="FF0066"/>
+                </a:solidFill>
+              </a:rPr>
+              <a:t>JOIN</a:t>
+            </a:r>
+            <a:r>
+              <a:rPr lang="en-US" altLang="en-US" sz="1600" dirty="0"/>
+              <a:t> employees </a:t>
+            </a:r>
+            <a:r>
+              <a:rPr lang="en-US" altLang="en-US" sz="1600" dirty="0">
+                <a:solidFill>
+                  <a:srgbClr val="FF0066"/>
+                </a:solidFill>
+              </a:rPr>
+              <a:t>AS</a:t>
+            </a:r>
+            <a:r>
+              <a:rPr lang="en-US" altLang="en-US" sz="1600" dirty="0"/>
+              <a:t> e </a:t>
+            </a:r>
+            <a:br>
+              <a:rPr lang="en-US" altLang="en-US" sz="1600" dirty="0"/>
+            </a:br>
+            <a:r>
+              <a:rPr lang="en-US" altLang="en-US" sz="1600" dirty="0"/>
+              <a:t>        </a:t>
+            </a:r>
+            <a:r>
+              <a:rPr lang="en-US" altLang="en-US" sz="1600" dirty="0">
+                <a:solidFill>
+                  <a:srgbClr val="FF0066"/>
+                </a:solidFill>
+              </a:rPr>
+              <a:t>ON</a:t>
+            </a:r>
+            <a:r>
+              <a:rPr lang="en-US" altLang="en-US" sz="1600" dirty="0"/>
+              <a:t> e.id = </a:t>
+            </a:r>
+            <a:r>
+              <a:rPr lang="en-US" altLang="en-US" sz="1600" dirty="0" err="1"/>
+              <a:t>ep.employee_id</a:t>
+            </a:r>
+            <a:br>
+              <a:rPr lang="en-US" altLang="en-US" sz="1600" dirty="0"/>
+            </a:br>
+            <a:r>
+              <a:rPr lang="en-US" altLang="en-US" sz="1600" dirty="0"/>
+              <a:t>    </a:t>
+            </a:r>
+            <a:r>
+              <a:rPr lang="en-US" altLang="en-US" sz="1600" dirty="0">
+                <a:solidFill>
+                  <a:srgbClr val="FF0066"/>
+                </a:solidFill>
+              </a:rPr>
+              <a:t>GROUP</a:t>
+            </a:r>
+            <a:r>
+              <a:rPr lang="en-US" altLang="en-US" sz="1600" dirty="0"/>
+              <a:t> </a:t>
+            </a:r>
+            <a:r>
+              <a:rPr lang="en-US" altLang="en-US" sz="1600" dirty="0">
+                <a:solidFill>
+                  <a:srgbClr val="FF0066"/>
+                </a:solidFill>
+              </a:rPr>
+              <a:t>BY</a:t>
+            </a:r>
+            <a:r>
+              <a:rPr lang="en-US" altLang="en-US" sz="1600" dirty="0"/>
+              <a:t> 1,2,3</a:t>
+            </a:r>
+            <a:br>
+              <a:rPr lang="en-US" altLang="en-US" sz="1600" dirty="0"/>
+            </a:br>
+            <a:r>
+              <a:rPr lang="en-US" altLang="en-US" sz="1600" dirty="0"/>
+              <a:t>)</a:t>
+            </a:r>
+          </a:p>
+        </p:txBody>
+      </p:sp>
+    </p:spTree>
+    <p:extLst>
+      <p:ext uri="{BB962C8B-B14F-4D97-AF65-F5344CB8AC3E}">
+        <p14:creationId xmlns:p14="http://schemas.microsoft.com/office/powerpoint/2010/main" val="3374988749"/>
       </p:ext>
     </p:extLst>
   </p:cSld>

</xml_diff>

<commit_message>
sql, time series, complete lin reg
</commit_message>
<xml_diff>
--- a/SQL/sql_map.pptx
+++ b/SQL/sql_map.pptx
@@ -23,6 +23,8 @@
     <p:sldId id="270" r:id="rId17"/>
     <p:sldId id="272" r:id="rId18"/>
     <p:sldId id="273" r:id="rId19"/>
+    <p:sldId id="274" r:id="rId20"/>
+    <p:sldId id="275" r:id="rId21"/>
   </p:sldIdLst>
   <p:sldSz cx="12192000" cy="6858000"/>
   <p:notesSz cx="6858000" cy="9144000"/>
@@ -276,7 +278,7 @@
           <a:p>
             <a:fld id="{FCB9DD6E-BDFF-41CE-9901-CD93B6D20A19}" type="datetimeFigureOut">
               <a:rPr lang="en-US" smtClean="0"/>
-              <a:t>3/27/2020</a:t>
+              <a:t>5/16/2020</a:t>
             </a:fld>
             <a:endParaRPr lang="en-US" dirty="0"/>
           </a:p>
@@ -474,7 +476,7 @@
           <a:p>
             <a:fld id="{FCB9DD6E-BDFF-41CE-9901-CD93B6D20A19}" type="datetimeFigureOut">
               <a:rPr lang="en-US" smtClean="0"/>
-              <a:t>3/27/2020</a:t>
+              <a:t>5/16/2020</a:t>
             </a:fld>
             <a:endParaRPr lang="en-US" dirty="0"/>
           </a:p>
@@ -682,7 +684,7 @@
           <a:p>
             <a:fld id="{FCB9DD6E-BDFF-41CE-9901-CD93B6D20A19}" type="datetimeFigureOut">
               <a:rPr lang="en-US" smtClean="0"/>
-              <a:t>3/27/2020</a:t>
+              <a:t>5/16/2020</a:t>
             </a:fld>
             <a:endParaRPr lang="en-US" dirty="0"/>
           </a:p>
@@ -880,7 +882,7 @@
           <a:p>
             <a:fld id="{FCB9DD6E-BDFF-41CE-9901-CD93B6D20A19}" type="datetimeFigureOut">
               <a:rPr lang="en-US" smtClean="0"/>
-              <a:t>3/27/2020</a:t>
+              <a:t>5/16/2020</a:t>
             </a:fld>
             <a:endParaRPr lang="en-US" dirty="0"/>
           </a:p>
@@ -1155,7 +1157,7 @@
           <a:p>
             <a:fld id="{FCB9DD6E-BDFF-41CE-9901-CD93B6D20A19}" type="datetimeFigureOut">
               <a:rPr lang="en-US" smtClean="0"/>
-              <a:t>3/27/2020</a:t>
+              <a:t>5/16/2020</a:t>
             </a:fld>
             <a:endParaRPr lang="en-US" dirty="0"/>
           </a:p>
@@ -1420,7 +1422,7 @@
           <a:p>
             <a:fld id="{FCB9DD6E-BDFF-41CE-9901-CD93B6D20A19}" type="datetimeFigureOut">
               <a:rPr lang="en-US" smtClean="0"/>
-              <a:t>3/27/2020</a:t>
+              <a:t>5/16/2020</a:t>
             </a:fld>
             <a:endParaRPr lang="en-US" dirty="0"/>
           </a:p>
@@ -1832,7 +1834,7 @@
           <a:p>
             <a:fld id="{FCB9DD6E-BDFF-41CE-9901-CD93B6D20A19}" type="datetimeFigureOut">
               <a:rPr lang="en-US" smtClean="0"/>
-              <a:t>3/27/2020</a:t>
+              <a:t>5/16/2020</a:t>
             </a:fld>
             <a:endParaRPr lang="en-US" dirty="0"/>
           </a:p>
@@ -1973,7 +1975,7 @@
           <a:p>
             <a:fld id="{FCB9DD6E-BDFF-41CE-9901-CD93B6D20A19}" type="datetimeFigureOut">
               <a:rPr lang="en-US" smtClean="0"/>
-              <a:t>3/27/2020</a:t>
+              <a:t>5/16/2020</a:t>
             </a:fld>
             <a:endParaRPr lang="en-US" dirty="0"/>
           </a:p>
@@ -2086,7 +2088,7 @@
           <a:p>
             <a:fld id="{FCB9DD6E-BDFF-41CE-9901-CD93B6D20A19}" type="datetimeFigureOut">
               <a:rPr lang="en-US" smtClean="0"/>
-              <a:t>3/27/2020</a:t>
+              <a:t>5/16/2020</a:t>
             </a:fld>
             <a:endParaRPr lang="en-US" dirty="0"/>
           </a:p>
@@ -2397,7 +2399,7 @@
           <a:p>
             <a:fld id="{FCB9DD6E-BDFF-41CE-9901-CD93B6D20A19}" type="datetimeFigureOut">
               <a:rPr lang="en-US" smtClean="0"/>
-              <a:t>3/27/2020</a:t>
+              <a:t>5/16/2020</a:t>
             </a:fld>
             <a:endParaRPr lang="en-US" dirty="0"/>
           </a:p>
@@ -2685,7 +2687,7 @@
           <a:p>
             <a:fld id="{FCB9DD6E-BDFF-41CE-9901-CD93B6D20A19}" type="datetimeFigureOut">
               <a:rPr lang="en-US" smtClean="0"/>
-              <a:t>3/27/2020</a:t>
+              <a:t>5/16/2020</a:t>
             </a:fld>
             <a:endParaRPr lang="en-US" dirty="0"/>
           </a:p>
@@ -2926,7 +2928,7 @@
           <a:p>
             <a:fld id="{FCB9DD6E-BDFF-41CE-9901-CD93B6D20A19}" type="datetimeFigureOut">
               <a:rPr lang="en-US" smtClean="0"/>
-              <a:t>3/27/2020</a:t>
+              <a:t>5/16/2020</a:t>
             </a:fld>
             <a:endParaRPr lang="en-US" dirty="0"/>
           </a:p>
@@ -13323,6 +13325,1146 @@
 </p:sld>
 </file>
 
+<file path=ppt/slides/slide19.xml><?xml version="1.0" encoding="utf-8"?>
+<p:sld xmlns:a="http://schemas.openxmlformats.org/drawingml/2006/main" xmlns:r="http://schemas.openxmlformats.org/officeDocument/2006/relationships" xmlns:p="http://schemas.openxmlformats.org/presentationml/2006/main">
+  <p:cSld>
+    <p:spTree>
+      <p:nvGrpSpPr>
+        <p:cNvPr id="1" name=""/>
+        <p:cNvGrpSpPr/>
+        <p:nvPr/>
+      </p:nvGrpSpPr>
+      <p:grpSpPr>
+        <a:xfrm>
+          <a:off x="0" y="0"/>
+          <a:ext cx="0" cy="0"/>
+          <a:chOff x="0" y="0"/>
+          <a:chExt cx="0" cy="0"/>
+        </a:xfrm>
+      </p:grpSpPr>
+      <p:sp>
+        <p:nvSpPr>
+          <p:cNvPr id="4" name="Title 1">
+            <a:extLst>
+              <a:ext uri="{FF2B5EF4-FFF2-40B4-BE49-F238E27FC236}">
+                <a16:creationId xmlns:a16="http://schemas.microsoft.com/office/drawing/2014/main" id="{34206686-79E6-4D1A-AFDC-1B08216F2B2C}"/>
+              </a:ext>
+            </a:extLst>
+          </p:cNvPr>
+          <p:cNvSpPr txBox="1">
+            <a:spLocks/>
+          </p:cNvSpPr>
+          <p:nvPr/>
+        </p:nvSpPr>
+        <p:spPr>
+          <a:xfrm>
+            <a:off x="-1" y="18256"/>
+            <a:ext cx="4854747" cy="565944"/>
+          </a:xfrm>
+          <a:prstGeom prst="rect">
+            <a:avLst/>
+          </a:prstGeom>
+        </p:spPr>
+        <p:txBody>
+          <a:bodyPr vert="horz" lIns="91440" tIns="45720" rIns="91440" bIns="45720" rtlCol="0" anchor="ctr">
+            <a:normAutofit/>
+          </a:bodyPr>
+          <a:lstStyle>
+            <a:lvl1pPr algn="l" defTabSz="914400" rtl="0" eaLnBrk="1" latinLnBrk="0" hangingPunct="1">
+              <a:lnSpc>
+                <a:spcPct val="90000"/>
+              </a:lnSpc>
+              <a:spcBef>
+                <a:spcPct val="0"/>
+              </a:spcBef>
+              <a:buNone/>
+              <a:defRPr sz="4400" kern="1200">
+                <a:solidFill>
+                  <a:schemeClr val="tx1"/>
+                </a:solidFill>
+                <a:latin typeface="+mj-lt"/>
+                <a:ea typeface="+mj-ea"/>
+                <a:cs typeface="+mj-cs"/>
+              </a:defRPr>
+            </a:lvl1pPr>
+          </a:lstStyle>
+          <a:p>
+            <a:r>
+              <a:rPr lang="en-US" sz="3200" b="1" i="1" dirty="0">
+                <a:latin typeface="+mn-lt"/>
+              </a:rPr>
+              <a:t>EXAMPLES</a:t>
+            </a:r>
+          </a:p>
+        </p:txBody>
+      </p:sp>
+      <p:pic>
+        <p:nvPicPr>
+          <p:cNvPr id="15" name="Picture 14">
+            <a:extLst>
+              <a:ext uri="{FF2B5EF4-FFF2-40B4-BE49-F238E27FC236}">
+                <a16:creationId xmlns:a16="http://schemas.microsoft.com/office/drawing/2014/main" id="{0FB204C0-BA78-448D-8410-D644551AB5A4}"/>
+              </a:ext>
+            </a:extLst>
+          </p:cNvPr>
+          <p:cNvPicPr>
+            <a:picLocks noChangeAspect="1"/>
+          </p:cNvPicPr>
+          <p:nvPr/>
+        </p:nvPicPr>
+        <p:blipFill>
+          <a:blip r:embed="rId2"/>
+          <a:stretch>
+            <a:fillRect/>
+          </a:stretch>
+        </p:blipFill>
+        <p:spPr>
+          <a:xfrm>
+            <a:off x="5814648" y="75888"/>
+            <a:ext cx="4531916" cy="6706224"/>
+          </a:xfrm>
+          <a:prstGeom prst="rect">
+            <a:avLst/>
+          </a:prstGeom>
+        </p:spPr>
+      </p:pic>
+      <p:grpSp>
+        <p:nvGrpSpPr>
+          <p:cNvPr id="17" name="Group 16">
+            <a:extLst>
+              <a:ext uri="{FF2B5EF4-FFF2-40B4-BE49-F238E27FC236}">
+                <a16:creationId xmlns:a16="http://schemas.microsoft.com/office/drawing/2014/main" id="{F2163223-4100-4AD2-8F47-E131141ADA69}"/>
+              </a:ext>
+            </a:extLst>
+          </p:cNvPr>
+          <p:cNvGrpSpPr/>
+          <p:nvPr/>
+        </p:nvGrpSpPr>
+        <p:grpSpPr>
+          <a:xfrm>
+            <a:off x="2052435" y="1589490"/>
+            <a:ext cx="2730580" cy="3442608"/>
+            <a:chOff x="184558" y="706352"/>
+            <a:chExt cx="2730580" cy="3442608"/>
+          </a:xfrm>
+        </p:grpSpPr>
+        <p:grpSp>
+          <p:nvGrpSpPr>
+            <p:cNvPr id="16" name="Group 15">
+              <a:extLst>
+                <a:ext uri="{FF2B5EF4-FFF2-40B4-BE49-F238E27FC236}">
+                  <a16:creationId xmlns:a16="http://schemas.microsoft.com/office/drawing/2014/main" id="{F551B163-F363-48D1-9DD0-9DF1726D95A4}"/>
+                </a:ext>
+              </a:extLst>
+            </p:cNvPr>
+            <p:cNvGrpSpPr/>
+            <p:nvPr/>
+          </p:nvGrpSpPr>
+          <p:grpSpPr>
+            <a:xfrm>
+              <a:off x="184558" y="752218"/>
+              <a:ext cx="2730580" cy="3396742"/>
+              <a:chOff x="184558" y="752218"/>
+              <a:chExt cx="2730580" cy="3396742"/>
+            </a:xfrm>
+          </p:grpSpPr>
+          <p:pic>
+            <p:nvPicPr>
+              <p:cNvPr id="7" name="Picture 6">
+                <a:extLst>
+                  <a:ext uri="{FF2B5EF4-FFF2-40B4-BE49-F238E27FC236}">
+                    <a16:creationId xmlns:a16="http://schemas.microsoft.com/office/drawing/2014/main" id="{AF52BBE6-6C78-43A1-A309-A47581E2F38C}"/>
+                  </a:ext>
+                </a:extLst>
+              </p:cNvPr>
+              <p:cNvPicPr>
+                <a:picLocks noChangeAspect="1"/>
+              </p:cNvPicPr>
+              <p:nvPr/>
+            </p:nvPicPr>
+            <p:blipFill rotWithShape="1">
+              <a:blip r:embed="rId3"/>
+              <a:srcRect t="26266" r="61448" b="19000"/>
+              <a:stretch/>
+            </p:blipFill>
+            <p:spPr>
+              <a:xfrm>
+                <a:off x="407134" y="1978672"/>
+                <a:ext cx="1413852" cy="1180123"/>
+              </a:xfrm>
+              <a:prstGeom prst="rect">
+                <a:avLst/>
+              </a:prstGeom>
+            </p:spPr>
+          </p:pic>
+          <p:sp>
+            <p:nvSpPr>
+              <p:cNvPr id="13" name="Rectangle 3">
+                <a:extLst>
+                  <a:ext uri="{FF2B5EF4-FFF2-40B4-BE49-F238E27FC236}">
+                    <a16:creationId xmlns:a16="http://schemas.microsoft.com/office/drawing/2014/main" id="{5ADF6B3B-2391-47F0-A38B-487133C168FB}"/>
+                  </a:ext>
+                </a:extLst>
+              </p:cNvPr>
+              <p:cNvSpPr>
+                <a:spLocks noChangeArrowheads="1"/>
+              </p:cNvSpPr>
+              <p:nvPr/>
+            </p:nvSpPr>
+            <p:spPr bwMode="auto">
+              <a:xfrm>
+                <a:off x="184558" y="752218"/>
+                <a:ext cx="2512276" cy="1200329"/>
+              </a:xfrm>
+              <a:prstGeom prst="rect">
+                <a:avLst/>
+              </a:prstGeom>
+              <a:solidFill>
+                <a:srgbClr val="FFFFFF"/>
+              </a:solidFill>
+              <a:ln>
+                <a:noFill/>
+              </a:ln>
+              <a:effectLst/>
+              <a:extLst>
+                <a:ext uri="{91240B29-F687-4F45-9708-019B960494DF}">
+                  <a14:hiddenLine xmlns:a14="http://schemas.microsoft.com/office/drawing/2010/main" w="9525">
+                    <a:solidFill>
+                      <a:schemeClr val="tx1"/>
+                    </a:solidFill>
+                    <a:miter lim="800000"/>
+                    <a:headEnd/>
+                    <a:tailEnd/>
+                  </a14:hiddenLine>
+                </a:ext>
+                <a:ext uri="{AF507438-7753-43E0-B8FC-AC1667EBCBE1}">
+                  <a14:hiddenEffects xmlns:a14="http://schemas.microsoft.com/office/drawing/2010/main">
+                    <a:effectLst>
+                      <a:outerShdw dist="35921" dir="2700000" algn="ctr" rotWithShape="0">
+                        <a:schemeClr val="bg2"/>
+                      </a:outerShdw>
+                    </a:effectLst>
+                  </a14:hiddenEffects>
+                </a:ext>
+              </a:extLst>
+            </p:spPr>
+            <p:txBody>
+              <a:bodyPr vert="horz" wrap="square" lIns="91440" tIns="45720" rIns="91440" bIns="45720" numCol="1" anchor="ctr" anchorCtr="0" compatLnSpc="1">
+                <a:prstTxWarp prst="textNoShape">
+                  <a:avLst/>
+                </a:prstTxWarp>
+                <a:spAutoFit/>
+              </a:bodyPr>
+              <a:lstStyle>
+                <a:lvl1pPr eaLnBrk="0" fontAlgn="base" hangingPunct="0">
+                  <a:spcBef>
+                    <a:spcPct val="0"/>
+                  </a:spcBef>
+                  <a:spcAft>
+                    <a:spcPct val="0"/>
+                  </a:spcAft>
+                  <a:defRPr>
+                    <a:solidFill>
+                      <a:schemeClr val="tx1"/>
+                    </a:solidFill>
+                    <a:latin typeface="Arial" panose="020B0604020202020204" pitchFamily="34" charset="0"/>
+                  </a:defRPr>
+                </a:lvl1pPr>
+                <a:lvl2pPr eaLnBrk="0" fontAlgn="base" hangingPunct="0">
+                  <a:spcBef>
+                    <a:spcPct val="0"/>
+                  </a:spcBef>
+                  <a:spcAft>
+                    <a:spcPct val="0"/>
+                  </a:spcAft>
+                  <a:defRPr>
+                    <a:solidFill>
+                      <a:schemeClr val="tx1"/>
+                    </a:solidFill>
+                    <a:latin typeface="Arial" panose="020B0604020202020204" pitchFamily="34" charset="0"/>
+                  </a:defRPr>
+                </a:lvl2pPr>
+                <a:lvl3pPr eaLnBrk="0" fontAlgn="base" hangingPunct="0">
+                  <a:spcBef>
+                    <a:spcPct val="0"/>
+                  </a:spcBef>
+                  <a:spcAft>
+                    <a:spcPct val="0"/>
+                  </a:spcAft>
+                  <a:defRPr>
+                    <a:solidFill>
+                      <a:schemeClr val="tx1"/>
+                    </a:solidFill>
+                    <a:latin typeface="Arial" panose="020B0604020202020204" pitchFamily="34" charset="0"/>
+                  </a:defRPr>
+                </a:lvl3pPr>
+                <a:lvl4pPr eaLnBrk="0" fontAlgn="base" hangingPunct="0">
+                  <a:spcBef>
+                    <a:spcPct val="0"/>
+                  </a:spcBef>
+                  <a:spcAft>
+                    <a:spcPct val="0"/>
+                  </a:spcAft>
+                  <a:defRPr>
+                    <a:solidFill>
+                      <a:schemeClr val="tx1"/>
+                    </a:solidFill>
+                    <a:latin typeface="Arial" panose="020B0604020202020204" pitchFamily="34" charset="0"/>
+                  </a:defRPr>
+                </a:lvl4pPr>
+                <a:lvl5pPr eaLnBrk="0" fontAlgn="base" hangingPunct="0">
+                  <a:spcBef>
+                    <a:spcPct val="0"/>
+                  </a:spcBef>
+                  <a:spcAft>
+                    <a:spcPct val="0"/>
+                  </a:spcAft>
+                  <a:defRPr>
+                    <a:solidFill>
+                      <a:schemeClr val="tx1"/>
+                    </a:solidFill>
+                    <a:latin typeface="Arial" panose="020B0604020202020204" pitchFamily="34" charset="0"/>
+                  </a:defRPr>
+                </a:lvl5pPr>
+                <a:lvl6pPr eaLnBrk="0" fontAlgn="base" hangingPunct="0">
+                  <a:spcBef>
+                    <a:spcPct val="0"/>
+                  </a:spcBef>
+                  <a:spcAft>
+                    <a:spcPct val="0"/>
+                  </a:spcAft>
+                  <a:defRPr>
+                    <a:solidFill>
+                      <a:schemeClr val="tx1"/>
+                    </a:solidFill>
+                    <a:latin typeface="Arial" panose="020B0604020202020204" pitchFamily="34" charset="0"/>
+                  </a:defRPr>
+                </a:lvl6pPr>
+                <a:lvl7pPr eaLnBrk="0" fontAlgn="base" hangingPunct="0">
+                  <a:spcBef>
+                    <a:spcPct val="0"/>
+                  </a:spcBef>
+                  <a:spcAft>
+                    <a:spcPct val="0"/>
+                  </a:spcAft>
+                  <a:defRPr>
+                    <a:solidFill>
+                      <a:schemeClr val="tx1"/>
+                    </a:solidFill>
+                    <a:latin typeface="Arial" panose="020B0604020202020204" pitchFamily="34" charset="0"/>
+                  </a:defRPr>
+                </a:lvl7pPr>
+                <a:lvl8pPr eaLnBrk="0" fontAlgn="base" hangingPunct="0">
+                  <a:spcBef>
+                    <a:spcPct val="0"/>
+                  </a:spcBef>
+                  <a:spcAft>
+                    <a:spcPct val="0"/>
+                  </a:spcAft>
+                  <a:defRPr>
+                    <a:solidFill>
+                      <a:schemeClr val="tx1"/>
+                    </a:solidFill>
+                    <a:latin typeface="Arial" panose="020B0604020202020204" pitchFamily="34" charset="0"/>
+                  </a:defRPr>
+                </a:lvl8pPr>
+                <a:lvl9pPr eaLnBrk="0" fontAlgn="base" hangingPunct="0">
+                  <a:spcBef>
+                    <a:spcPct val="0"/>
+                  </a:spcBef>
+                  <a:spcAft>
+                    <a:spcPct val="0"/>
+                  </a:spcAft>
+                  <a:defRPr>
+                    <a:solidFill>
+                      <a:schemeClr val="tx1"/>
+                    </a:solidFill>
+                    <a:latin typeface="Arial" panose="020B0604020202020204" pitchFamily="34" charset="0"/>
+                  </a:defRPr>
+                </a:lvl9pPr>
+              </a:lstStyle>
+              <a:p>
+                <a:pPr marL="0" marR="0" lvl="0" indent="0" algn="l" defTabSz="914400" rtl="0" eaLnBrk="0" fontAlgn="base" latinLnBrk="0" hangingPunct="0">
+                  <a:lnSpc>
+                    <a:spcPct val="100000"/>
+                  </a:lnSpc>
+                  <a:spcBef>
+                    <a:spcPct val="0"/>
+                  </a:spcBef>
+                  <a:spcAft>
+                    <a:spcPct val="0"/>
+                  </a:spcAft>
+                  <a:buClrTx/>
+                  <a:buSzTx/>
+                  <a:buFontTx/>
+                  <a:buNone/>
+                  <a:tabLst/>
+                </a:pPr>
+                <a:r>
+                  <a:rPr kumimoji="0" lang="en-US" altLang="en-US" sz="1200" b="1" i="0" u="none" strike="noStrike" cap="none" normalizeH="0" baseline="0" dirty="0" err="1">
+                    <a:ln>
+                      <a:noFill/>
+                    </a:ln>
+                    <a:solidFill>
+                      <a:srgbClr val="222222"/>
+                    </a:solidFill>
+                    <a:effectLst/>
+                    <a:latin typeface="+mn-lt"/>
+                  </a:rPr>
+                  <a:t>Контекст</a:t>
+                </a:r>
+                <a:r>
+                  <a:rPr kumimoji="0" lang="en-US" altLang="en-US" sz="1200" b="1" i="0" u="none" strike="noStrike" cap="none" normalizeH="0" baseline="0" dirty="0">
+                    <a:ln>
+                      <a:noFill/>
+                    </a:ln>
+                    <a:solidFill>
+                      <a:srgbClr val="222222"/>
+                    </a:solidFill>
+                    <a:effectLst/>
+                    <a:latin typeface="+mn-lt"/>
+                  </a:rPr>
+                  <a:t>:</a:t>
+                </a:r>
+                <a:r>
+                  <a:rPr kumimoji="0" lang="en-US" altLang="en-US" sz="1200" b="0" i="0" u="none" strike="noStrike" cap="none" normalizeH="0" baseline="0" dirty="0">
+                    <a:ln>
+                      <a:noFill/>
+                    </a:ln>
+                    <a:solidFill>
+                      <a:srgbClr val="222222"/>
+                    </a:solidFill>
+                    <a:effectLst/>
+                    <a:latin typeface="+mn-lt"/>
+                  </a:rPr>
+                  <a:t> </a:t>
+                </a:r>
+                <a:r>
+                  <a:rPr kumimoji="0" lang="en-US" altLang="en-US" sz="1200" b="0" i="0" u="none" strike="noStrike" cap="none" normalizeH="0" baseline="0" dirty="0" err="1">
+                    <a:ln>
+                      <a:noFill/>
+                    </a:ln>
+                    <a:solidFill>
+                      <a:srgbClr val="222222"/>
+                    </a:solidFill>
+                    <a:effectLst/>
+                    <a:latin typeface="+mn-lt"/>
+                  </a:rPr>
+                  <a:t>часто</a:t>
+                </a:r>
+                <a:r>
+                  <a:rPr kumimoji="0" lang="en-US" altLang="en-US" sz="1200" b="0" i="0" u="none" strike="noStrike" cap="none" normalizeH="0" baseline="0" dirty="0">
+                    <a:ln>
+                      <a:noFill/>
+                    </a:ln>
+                    <a:solidFill>
+                      <a:srgbClr val="222222"/>
+                    </a:solidFill>
+                    <a:effectLst/>
+                    <a:latin typeface="+mn-lt"/>
+                  </a:rPr>
+                  <a:t> </a:t>
+                </a:r>
+                <a:r>
+                  <a:rPr kumimoji="0" lang="en-US" altLang="en-US" sz="1200" b="0" i="0" u="none" strike="noStrike" cap="none" normalizeH="0" baseline="0" dirty="0" err="1">
+                    <a:ln>
+                      <a:noFill/>
+                    </a:ln>
+                    <a:solidFill>
+                      <a:srgbClr val="222222"/>
+                    </a:solidFill>
+                    <a:effectLst/>
+                    <a:latin typeface="+mn-lt"/>
+                  </a:rPr>
+                  <a:t>полезно</a:t>
+                </a:r>
+                <a:r>
+                  <a:rPr kumimoji="0" lang="en-US" altLang="en-US" sz="1200" b="0" i="0" u="none" strike="noStrike" cap="none" normalizeH="0" baseline="0" dirty="0">
+                    <a:ln>
+                      <a:noFill/>
+                    </a:ln>
+                    <a:solidFill>
+                      <a:srgbClr val="222222"/>
+                    </a:solidFill>
+                    <a:effectLst/>
+                    <a:latin typeface="+mn-lt"/>
+                  </a:rPr>
+                  <a:t> </a:t>
+                </a:r>
+                <a:r>
+                  <a:rPr kumimoji="0" lang="en-US" altLang="en-US" sz="1200" b="0" i="0" u="none" strike="noStrike" cap="none" normalizeH="0" baseline="0" dirty="0" err="1">
+                    <a:ln>
+                      <a:noFill/>
+                    </a:ln>
+                    <a:solidFill>
+                      <a:srgbClr val="222222"/>
+                    </a:solidFill>
+                    <a:effectLst/>
+                    <a:latin typeface="+mn-lt"/>
+                  </a:rPr>
+                  <a:t>знать</a:t>
+                </a:r>
+                <a:r>
+                  <a:rPr kumimoji="0" lang="en-US" altLang="en-US" sz="1200" b="0" i="0" u="none" strike="noStrike" cap="none" normalizeH="0" baseline="0" dirty="0">
+                    <a:ln>
+                      <a:noFill/>
+                    </a:ln>
+                    <a:solidFill>
+                      <a:srgbClr val="222222"/>
+                    </a:solidFill>
+                    <a:effectLst/>
+                    <a:latin typeface="+mn-lt"/>
+                  </a:rPr>
+                  <a:t>, </a:t>
+                </a:r>
+                <a:r>
+                  <a:rPr kumimoji="0" lang="en-US" altLang="en-US" sz="1200" b="0" i="0" u="none" strike="noStrike" cap="none" normalizeH="0" baseline="0" dirty="0" err="1">
+                    <a:ln>
+                      <a:noFill/>
+                    </a:ln>
+                    <a:solidFill>
+                      <a:srgbClr val="222222"/>
+                    </a:solidFill>
+                    <a:effectLst/>
+                    <a:latin typeface="+mn-lt"/>
+                  </a:rPr>
+                  <a:t>как</a:t>
+                </a:r>
+                <a:r>
+                  <a:rPr kumimoji="0" lang="en-US" altLang="en-US" sz="1200" b="0" i="0" u="none" strike="noStrike" cap="none" normalizeH="0" baseline="0" dirty="0">
+                    <a:ln>
+                      <a:noFill/>
+                    </a:ln>
+                    <a:solidFill>
+                      <a:srgbClr val="222222"/>
+                    </a:solidFill>
+                    <a:effectLst/>
+                    <a:latin typeface="+mn-lt"/>
+                  </a:rPr>
+                  <a:t> </a:t>
+                </a:r>
+                <a:r>
+                  <a:rPr kumimoji="0" lang="en-US" altLang="en-US" sz="1200" b="0" i="0" u="none" strike="noStrike" cap="none" normalizeH="0" baseline="0" dirty="0" err="1">
+                    <a:ln>
+                      <a:noFill/>
+                    </a:ln>
+                    <a:solidFill>
+                      <a:srgbClr val="222222"/>
+                    </a:solidFill>
+                    <a:effectLst/>
+                    <a:latin typeface="+mn-lt"/>
+                  </a:rPr>
+                  <a:t>изменяется</a:t>
+                </a:r>
+                <a:r>
+                  <a:rPr kumimoji="0" lang="en-US" altLang="en-US" sz="1200" b="0" i="0" u="none" strike="noStrike" cap="none" normalizeH="0" baseline="0" dirty="0">
+                    <a:ln>
+                      <a:noFill/>
+                    </a:ln>
+                    <a:solidFill>
+                      <a:srgbClr val="222222"/>
+                    </a:solidFill>
+                    <a:effectLst/>
+                    <a:latin typeface="+mn-lt"/>
+                  </a:rPr>
+                  <a:t> </a:t>
+                </a:r>
+                <a:r>
+                  <a:rPr kumimoji="0" lang="en-US" altLang="en-US" sz="1200" b="0" i="0" u="none" strike="noStrike" cap="none" normalizeH="0" baseline="0" dirty="0" err="1">
+                    <a:ln>
+                      <a:noFill/>
+                    </a:ln>
+                    <a:solidFill>
+                      <a:srgbClr val="222222"/>
+                    </a:solidFill>
+                    <a:effectLst/>
+                    <a:latin typeface="+mn-lt"/>
+                  </a:rPr>
+                  <a:t>ключевая</a:t>
+                </a:r>
+                <a:r>
+                  <a:rPr kumimoji="0" lang="en-US" altLang="en-US" sz="1200" b="0" i="0" u="none" strike="noStrike" cap="none" normalizeH="0" baseline="0" dirty="0">
+                    <a:ln>
+                      <a:noFill/>
+                    </a:ln>
+                    <a:solidFill>
+                      <a:srgbClr val="222222"/>
+                    </a:solidFill>
+                    <a:effectLst/>
+                    <a:latin typeface="+mn-lt"/>
+                  </a:rPr>
+                  <a:t> </a:t>
+                </a:r>
+                <a:r>
+                  <a:rPr kumimoji="0" lang="en-US" altLang="en-US" sz="1200" b="0" i="0" u="none" strike="noStrike" cap="none" normalizeH="0" baseline="0" dirty="0" err="1">
+                    <a:ln>
+                      <a:noFill/>
+                    </a:ln>
+                    <a:solidFill>
+                      <a:srgbClr val="222222"/>
+                    </a:solidFill>
+                    <a:effectLst/>
+                    <a:latin typeface="+mn-lt"/>
+                  </a:rPr>
+                  <a:t>метрика</a:t>
+                </a:r>
+                <a:r>
+                  <a:rPr kumimoji="0" lang="en-US" altLang="en-US" sz="1200" b="0" i="0" u="none" strike="noStrike" cap="none" normalizeH="0" baseline="0" dirty="0">
+                    <a:ln>
+                      <a:noFill/>
+                    </a:ln>
+                    <a:solidFill>
+                      <a:srgbClr val="222222"/>
+                    </a:solidFill>
+                    <a:effectLst/>
+                    <a:latin typeface="+mn-lt"/>
+                  </a:rPr>
+                  <a:t>, </a:t>
+                </a:r>
+                <a:r>
+                  <a:rPr kumimoji="0" lang="en-US" altLang="en-US" sz="1200" b="0" i="0" u="none" strike="noStrike" cap="none" normalizeH="0" baseline="0" dirty="0" err="1">
+                    <a:ln>
+                      <a:noFill/>
+                    </a:ln>
+                    <a:solidFill>
+                      <a:srgbClr val="222222"/>
+                    </a:solidFill>
+                    <a:effectLst/>
+                    <a:latin typeface="+mn-lt"/>
+                  </a:rPr>
+                  <a:t>например</a:t>
+                </a:r>
+                <a:r>
+                  <a:rPr kumimoji="0" lang="en-US" altLang="en-US" sz="1200" b="0" i="0" u="none" strike="noStrike" cap="none" normalizeH="0" baseline="0" dirty="0">
+                    <a:ln>
+                      <a:noFill/>
+                    </a:ln>
+                    <a:solidFill>
+                      <a:srgbClr val="222222"/>
+                    </a:solidFill>
+                    <a:effectLst/>
+                    <a:latin typeface="+mn-lt"/>
+                  </a:rPr>
+                  <a:t>, </a:t>
+                </a:r>
+                <a:r>
+                  <a:rPr kumimoji="0" lang="en-US" altLang="en-US" sz="1200" b="0" i="0" u="none" strike="noStrike" cap="none" normalizeH="0" baseline="0" dirty="0" err="1">
+                    <a:ln>
+                      <a:noFill/>
+                    </a:ln>
+                    <a:solidFill>
+                      <a:srgbClr val="222222"/>
+                    </a:solidFill>
+                    <a:effectLst/>
+                    <a:latin typeface="+mn-lt"/>
+                  </a:rPr>
+                  <a:t>месячная</a:t>
+                </a:r>
+                <a:r>
+                  <a:rPr kumimoji="0" lang="en-US" altLang="en-US" sz="1200" b="0" i="0" u="none" strike="noStrike" cap="none" normalizeH="0" baseline="0" dirty="0">
+                    <a:ln>
+                      <a:noFill/>
+                    </a:ln>
+                    <a:solidFill>
+                      <a:srgbClr val="222222"/>
+                    </a:solidFill>
+                    <a:effectLst/>
+                    <a:latin typeface="+mn-lt"/>
+                  </a:rPr>
+                  <a:t> </a:t>
+                </a:r>
+                <a:r>
+                  <a:rPr kumimoji="0" lang="en-US" altLang="en-US" sz="1200" b="0" i="0" u="none" strike="noStrike" cap="none" normalizeH="0" baseline="0" dirty="0" err="1">
+                    <a:ln>
+                      <a:noFill/>
+                    </a:ln>
+                    <a:solidFill>
+                      <a:srgbClr val="222222"/>
+                    </a:solidFill>
+                    <a:effectLst/>
+                    <a:latin typeface="+mn-lt"/>
+                  </a:rPr>
+                  <a:t>аудитория</a:t>
+                </a:r>
+                <a:r>
+                  <a:rPr kumimoji="0" lang="en-US" altLang="en-US" sz="1200" b="0" i="0" u="none" strike="noStrike" cap="none" normalizeH="0" baseline="0" dirty="0">
+                    <a:ln>
+                      <a:noFill/>
+                    </a:ln>
+                    <a:solidFill>
+                      <a:srgbClr val="222222"/>
+                    </a:solidFill>
+                    <a:effectLst/>
+                    <a:latin typeface="+mn-lt"/>
+                  </a:rPr>
+                  <a:t> </a:t>
+                </a:r>
+                <a:r>
+                  <a:rPr kumimoji="0" lang="en-US" altLang="en-US" sz="1200" b="0" i="0" u="none" strike="noStrike" cap="none" normalizeH="0" baseline="0" dirty="0" err="1">
+                    <a:ln>
+                      <a:noFill/>
+                    </a:ln>
+                    <a:solidFill>
+                      <a:srgbClr val="222222"/>
+                    </a:solidFill>
+                    <a:effectLst/>
+                    <a:latin typeface="+mn-lt"/>
+                  </a:rPr>
+                  <a:t>активных</a:t>
+                </a:r>
+                <a:r>
+                  <a:rPr kumimoji="0" lang="en-US" altLang="en-US" sz="1200" b="0" i="0" u="none" strike="noStrike" cap="none" normalizeH="0" baseline="0" dirty="0">
+                    <a:ln>
+                      <a:noFill/>
+                    </a:ln>
+                    <a:solidFill>
+                      <a:srgbClr val="222222"/>
+                    </a:solidFill>
+                    <a:effectLst/>
+                    <a:latin typeface="+mn-lt"/>
+                  </a:rPr>
+                  <a:t> </a:t>
+                </a:r>
+                <a:r>
+                  <a:rPr kumimoji="0" lang="en-US" altLang="en-US" sz="1200" b="0" i="0" u="none" strike="noStrike" cap="none" normalizeH="0" baseline="0" dirty="0" err="1">
+                    <a:ln>
+                      <a:noFill/>
+                    </a:ln>
+                    <a:solidFill>
+                      <a:srgbClr val="222222"/>
+                    </a:solidFill>
+                    <a:effectLst/>
+                    <a:latin typeface="+mn-lt"/>
+                  </a:rPr>
+                  <a:t>пользователей</a:t>
+                </a:r>
+                <a:r>
+                  <a:rPr kumimoji="0" lang="en-US" altLang="en-US" sz="1200" b="0" i="0" u="none" strike="noStrike" cap="none" normalizeH="0" baseline="0" dirty="0">
+                    <a:ln>
+                      <a:noFill/>
+                    </a:ln>
+                    <a:solidFill>
+                      <a:srgbClr val="222222"/>
+                    </a:solidFill>
+                    <a:effectLst/>
+                    <a:latin typeface="+mn-lt"/>
+                  </a:rPr>
+                  <a:t>, </a:t>
+                </a:r>
+                <a:r>
+                  <a:rPr kumimoji="0" lang="en-US" altLang="en-US" sz="1200" b="0" i="0" u="none" strike="noStrike" cap="none" normalizeH="0" baseline="0" dirty="0" err="1">
+                    <a:ln>
+                      <a:noFill/>
+                    </a:ln>
+                    <a:solidFill>
+                      <a:srgbClr val="222222"/>
+                    </a:solidFill>
+                    <a:effectLst/>
+                    <a:latin typeface="+mn-lt"/>
+                  </a:rPr>
+                  <a:t>от</a:t>
+                </a:r>
+                <a:r>
+                  <a:rPr kumimoji="0" lang="en-US" altLang="en-US" sz="1200" b="0" i="0" u="none" strike="noStrike" cap="none" normalizeH="0" baseline="0" dirty="0">
+                    <a:ln>
+                      <a:noFill/>
+                    </a:ln>
+                    <a:solidFill>
+                      <a:srgbClr val="222222"/>
+                    </a:solidFill>
+                    <a:effectLst/>
+                    <a:latin typeface="+mn-lt"/>
+                  </a:rPr>
+                  <a:t> </a:t>
+                </a:r>
+                <a:r>
+                  <a:rPr kumimoji="0" lang="en-US" altLang="en-US" sz="1200" b="0" i="0" u="none" strike="noStrike" cap="none" normalizeH="0" baseline="0" dirty="0" err="1">
+                    <a:ln>
+                      <a:noFill/>
+                    </a:ln>
+                    <a:solidFill>
+                      <a:srgbClr val="222222"/>
+                    </a:solidFill>
+                    <a:effectLst/>
+                    <a:latin typeface="+mn-lt"/>
+                  </a:rPr>
+                  <a:t>месяца</a:t>
+                </a:r>
+                <a:r>
+                  <a:rPr kumimoji="0" lang="en-US" altLang="en-US" sz="1200" b="0" i="0" u="none" strike="noStrike" cap="none" normalizeH="0" baseline="0" dirty="0">
+                    <a:ln>
+                      <a:noFill/>
+                    </a:ln>
+                    <a:solidFill>
+                      <a:srgbClr val="222222"/>
+                    </a:solidFill>
+                    <a:effectLst/>
+                    <a:latin typeface="+mn-lt"/>
+                  </a:rPr>
+                  <a:t> к </a:t>
+                </a:r>
+                <a:r>
+                  <a:rPr kumimoji="0" lang="en-US" altLang="en-US" sz="1200" b="0" i="0" u="none" strike="noStrike" cap="none" normalizeH="0" baseline="0" dirty="0" err="1">
+                    <a:ln>
+                      <a:noFill/>
+                    </a:ln>
+                    <a:solidFill>
+                      <a:srgbClr val="222222"/>
+                    </a:solidFill>
+                    <a:effectLst/>
+                    <a:latin typeface="+mn-lt"/>
+                  </a:rPr>
+                  <a:t>месяцу</a:t>
+                </a:r>
+                <a:r>
+                  <a:rPr kumimoji="0" lang="en-US" altLang="en-US" sz="1200" b="0" i="0" u="none" strike="noStrike" cap="none" normalizeH="0" baseline="0" dirty="0">
+                    <a:ln>
+                      <a:noFill/>
+                    </a:ln>
+                    <a:solidFill>
+                      <a:srgbClr val="222222"/>
+                    </a:solidFill>
+                    <a:effectLst/>
+                    <a:latin typeface="+mn-lt"/>
+                  </a:rPr>
+                  <a:t>. </a:t>
+                </a:r>
+                <a:r>
+                  <a:rPr kumimoji="0" lang="en-US" altLang="en-US" sz="1200" b="0" i="0" u="none" strike="noStrike" cap="none" normalizeH="0" baseline="0" dirty="0" err="1">
+                    <a:ln>
+                      <a:noFill/>
+                    </a:ln>
+                    <a:solidFill>
+                      <a:srgbClr val="222222"/>
+                    </a:solidFill>
+                    <a:effectLst/>
+                    <a:latin typeface="+mn-lt"/>
+                  </a:rPr>
+                  <a:t>Допустим</a:t>
+                </a:r>
+                <a:r>
+                  <a:rPr kumimoji="0" lang="en-US" altLang="en-US" sz="1200" b="0" i="0" u="none" strike="noStrike" cap="none" normalizeH="0" baseline="0" dirty="0">
+                    <a:ln>
+                      <a:noFill/>
+                    </a:ln>
+                    <a:solidFill>
+                      <a:srgbClr val="222222"/>
+                    </a:solidFill>
+                    <a:effectLst/>
+                    <a:latin typeface="+mn-lt"/>
+                  </a:rPr>
+                  <a:t> у </a:t>
+                </a:r>
+                <a:r>
+                  <a:rPr kumimoji="0" lang="en-US" altLang="en-US" sz="1200" b="0" i="0" u="none" strike="noStrike" cap="none" normalizeH="0" baseline="0" dirty="0" err="1">
+                    <a:ln>
+                      <a:noFill/>
+                    </a:ln>
+                    <a:solidFill>
+                      <a:srgbClr val="222222"/>
+                    </a:solidFill>
+                    <a:effectLst/>
+                    <a:latin typeface="+mn-lt"/>
+                  </a:rPr>
+                  <a:t>нас</a:t>
+                </a:r>
+                <a:r>
+                  <a:rPr kumimoji="0" lang="en-US" altLang="en-US" sz="1200" b="0" i="0" u="none" strike="noStrike" cap="none" normalizeH="0" baseline="0" dirty="0">
+                    <a:ln>
+                      <a:noFill/>
+                    </a:ln>
+                    <a:solidFill>
+                      <a:srgbClr val="222222"/>
+                    </a:solidFill>
+                    <a:effectLst/>
+                    <a:latin typeface="+mn-lt"/>
+                  </a:rPr>
+                  <a:t> </a:t>
+                </a:r>
+                <a:r>
+                  <a:rPr kumimoji="0" lang="en-US" altLang="en-US" sz="1200" b="0" i="0" u="none" strike="noStrike" cap="none" normalizeH="0" baseline="0" dirty="0" err="1">
+                    <a:ln>
+                      <a:noFill/>
+                    </a:ln>
+                    <a:solidFill>
+                      <a:srgbClr val="222222"/>
+                    </a:solidFill>
+                    <a:effectLst/>
+                    <a:latin typeface="+mn-lt"/>
+                  </a:rPr>
+                  <a:t>есть</a:t>
+                </a:r>
+                <a:r>
+                  <a:rPr kumimoji="0" lang="en-US" altLang="en-US" sz="1200" b="0" i="0" u="none" strike="noStrike" cap="none" normalizeH="0" baseline="0" dirty="0">
+                    <a:ln>
+                      <a:noFill/>
+                    </a:ln>
+                    <a:solidFill>
+                      <a:srgbClr val="222222"/>
+                    </a:solidFill>
+                    <a:effectLst/>
+                    <a:latin typeface="+mn-lt"/>
+                  </a:rPr>
+                  <a:t> </a:t>
+                </a:r>
+                <a:r>
+                  <a:rPr kumimoji="0" lang="en-US" altLang="en-US" sz="1200" b="0" i="0" u="none" strike="noStrike" cap="none" normalizeH="0" baseline="0" dirty="0" err="1">
+                    <a:ln>
+                      <a:noFill/>
+                    </a:ln>
+                    <a:solidFill>
+                      <a:srgbClr val="222222"/>
+                    </a:solidFill>
+                    <a:effectLst/>
+                    <a:latin typeface="+mn-lt"/>
+                  </a:rPr>
+                  <a:t>таблица</a:t>
+                </a:r>
+                <a:r>
+                  <a:rPr kumimoji="0" lang="en-US" altLang="en-US" sz="1200" b="0" i="0" u="none" strike="noStrike" cap="none" normalizeH="0" baseline="0" dirty="0">
+                    <a:ln>
+                      <a:noFill/>
+                    </a:ln>
+                    <a:solidFill>
+                      <a:srgbClr val="222222"/>
+                    </a:solidFill>
+                    <a:effectLst/>
+                    <a:latin typeface="+mn-lt"/>
+                  </a:rPr>
+                  <a:t> logins в </a:t>
+                </a:r>
+                <a:r>
+                  <a:rPr kumimoji="0" lang="en-US" altLang="en-US" sz="1200" b="0" i="0" u="none" strike="noStrike" cap="none" normalizeH="0" baseline="0" dirty="0" err="1">
+                    <a:ln>
+                      <a:noFill/>
+                    </a:ln>
+                    <a:solidFill>
+                      <a:srgbClr val="222222"/>
+                    </a:solidFill>
+                    <a:effectLst/>
+                    <a:latin typeface="+mn-lt"/>
+                  </a:rPr>
+                  <a:t>таком</a:t>
+                </a:r>
+                <a:r>
+                  <a:rPr kumimoji="0" lang="en-US" altLang="en-US" sz="1200" b="0" i="0" u="none" strike="noStrike" cap="none" normalizeH="0" baseline="0" dirty="0">
+                    <a:ln>
+                      <a:noFill/>
+                    </a:ln>
+                    <a:solidFill>
+                      <a:srgbClr val="222222"/>
+                    </a:solidFill>
+                    <a:effectLst/>
+                    <a:latin typeface="+mn-lt"/>
+                  </a:rPr>
+                  <a:t> </a:t>
+                </a:r>
+                <a:r>
+                  <a:rPr kumimoji="0" lang="en-US" altLang="en-US" sz="1200" b="0" i="0" u="none" strike="noStrike" cap="none" normalizeH="0" baseline="0" dirty="0" err="1">
+                    <a:ln>
+                      <a:noFill/>
+                    </a:ln>
+                    <a:solidFill>
+                      <a:srgbClr val="222222"/>
+                    </a:solidFill>
+                    <a:effectLst/>
+                    <a:latin typeface="+mn-lt"/>
+                  </a:rPr>
+                  <a:t>виде</a:t>
+                </a:r>
+                <a:r>
+                  <a:rPr kumimoji="0" lang="en-US" altLang="en-US" sz="1200" b="0" i="0" u="none" strike="noStrike" cap="none" normalizeH="0" baseline="0" dirty="0">
+                    <a:ln>
+                      <a:noFill/>
+                    </a:ln>
+                    <a:solidFill>
+                      <a:srgbClr val="222222"/>
+                    </a:solidFill>
+                    <a:effectLst/>
+                    <a:latin typeface="+mn-lt"/>
+                  </a:rPr>
+                  <a:t>:</a:t>
+                </a:r>
+                <a:r>
+                  <a:rPr kumimoji="0" lang="en-US" altLang="en-US" sz="1200" b="0" i="0" u="none" strike="noStrike" cap="none" normalizeH="0" baseline="0" dirty="0">
+                    <a:ln>
+                      <a:noFill/>
+                    </a:ln>
+                    <a:solidFill>
+                      <a:schemeClr val="tx1"/>
+                    </a:solidFill>
+                    <a:effectLst/>
+                    <a:latin typeface="+mn-lt"/>
+                  </a:rPr>
+                  <a:t> </a:t>
+                </a:r>
+              </a:p>
+            </p:txBody>
+          </p:sp>
+          <p:sp>
+            <p:nvSpPr>
+              <p:cNvPr id="14" name="Rectangle 13">
+                <a:extLst>
+                  <a:ext uri="{FF2B5EF4-FFF2-40B4-BE49-F238E27FC236}">
+                    <a16:creationId xmlns:a16="http://schemas.microsoft.com/office/drawing/2014/main" id="{E9AAF8C1-EA12-4A6B-A2D0-F643C4B88AA4}"/>
+                  </a:ext>
+                </a:extLst>
+              </p:cNvPr>
+              <p:cNvSpPr/>
+              <p:nvPr/>
+            </p:nvSpPr>
+            <p:spPr>
+              <a:xfrm>
+                <a:off x="211017" y="3317963"/>
+                <a:ext cx="2704121" cy="830997"/>
+              </a:xfrm>
+              <a:prstGeom prst="rect">
+                <a:avLst/>
+              </a:prstGeom>
+            </p:spPr>
+            <p:txBody>
+              <a:bodyPr wrap="square">
+                <a:spAutoFit/>
+              </a:bodyPr>
+              <a:lstStyle/>
+              <a:p>
+                <a:r>
+                  <a:rPr lang="en-US" sz="1200" b="1" dirty="0" err="1"/>
+                  <a:t>Задача</a:t>
+                </a:r>
+                <a:r>
+                  <a:rPr lang="en-US" sz="1200" b="1" dirty="0"/>
+                  <a:t>: </a:t>
+                </a:r>
+                <a:r>
+                  <a:rPr lang="en-US" sz="1200" dirty="0" err="1"/>
+                  <a:t>найти</a:t>
+                </a:r>
+                <a:r>
+                  <a:rPr lang="en-US" sz="1200" dirty="0"/>
+                  <a:t> </a:t>
+                </a:r>
+                <a:r>
+                  <a:rPr lang="en-US" sz="1200" dirty="0" err="1"/>
+                  <a:t>ежемесячное</a:t>
+                </a:r>
+                <a:r>
+                  <a:rPr lang="en-US" sz="1200" dirty="0"/>
+                  <a:t> </a:t>
+                </a:r>
+                <a:r>
+                  <a:rPr lang="en-US" sz="1200" dirty="0" err="1"/>
+                  <a:t>процентное</a:t>
+                </a:r>
+                <a:r>
+                  <a:rPr lang="en-US" sz="1200" dirty="0"/>
+                  <a:t> </a:t>
+                </a:r>
+                <a:r>
+                  <a:rPr lang="en-US" sz="1200" dirty="0" err="1"/>
+                  <a:t>изменение</a:t>
+                </a:r>
+                <a:r>
+                  <a:rPr lang="en-US" sz="1200" dirty="0"/>
+                  <a:t> </a:t>
+                </a:r>
+                <a:r>
+                  <a:rPr lang="en-US" sz="1200" dirty="0" err="1"/>
+                  <a:t>месячной</a:t>
+                </a:r>
+                <a:r>
+                  <a:rPr lang="en-US" sz="1200" dirty="0"/>
+                  <a:t> </a:t>
+                </a:r>
+                <a:r>
+                  <a:rPr lang="en-US" sz="1200" dirty="0" err="1"/>
+                  <a:t>аудитории</a:t>
+                </a:r>
+                <a:r>
+                  <a:rPr lang="en-US" sz="1200" dirty="0"/>
+                  <a:t> </a:t>
+                </a:r>
+                <a:r>
+                  <a:rPr lang="en-US" sz="1200" dirty="0" err="1"/>
+                  <a:t>активных</a:t>
+                </a:r>
+                <a:r>
+                  <a:rPr lang="en-US" sz="1200" dirty="0"/>
+                  <a:t> </a:t>
+                </a:r>
+                <a:r>
+                  <a:rPr lang="en-US" sz="1200" dirty="0" err="1"/>
+                  <a:t>пользователей</a:t>
+                </a:r>
+                <a:r>
+                  <a:rPr lang="en-US" sz="1200" dirty="0"/>
+                  <a:t> (MAU).</a:t>
+                </a:r>
+              </a:p>
+            </p:txBody>
+          </p:sp>
+        </p:grpSp>
+        <p:sp>
+          <p:nvSpPr>
+            <p:cNvPr id="10" name="Rectangle 9">
+              <a:extLst>
+                <a:ext uri="{FF2B5EF4-FFF2-40B4-BE49-F238E27FC236}">
+                  <a16:creationId xmlns:a16="http://schemas.microsoft.com/office/drawing/2014/main" id="{613FCF3A-D373-44CE-B3FD-ED391B2BCBF7}"/>
+                </a:ext>
+              </a:extLst>
+            </p:cNvPr>
+            <p:cNvSpPr/>
+            <p:nvPr/>
+          </p:nvSpPr>
+          <p:spPr>
+            <a:xfrm>
+              <a:off x="184558" y="706352"/>
+              <a:ext cx="2512276" cy="3442608"/>
+            </a:xfrm>
+            <a:prstGeom prst="rect">
+              <a:avLst/>
+            </a:prstGeom>
+            <a:noFill/>
+          </p:spPr>
+          <p:style>
+            <a:lnRef idx="2">
+              <a:schemeClr val="accent1">
+                <a:shade val="50000"/>
+              </a:schemeClr>
+            </a:lnRef>
+            <a:fillRef idx="1">
+              <a:schemeClr val="accent1"/>
+            </a:fillRef>
+            <a:effectRef idx="0">
+              <a:schemeClr val="accent1"/>
+            </a:effectRef>
+            <a:fontRef idx="minor">
+              <a:schemeClr val="lt1"/>
+            </a:fontRef>
+          </p:style>
+          <p:txBody>
+            <a:bodyPr rtlCol="0" anchor="ctr"/>
+            <a:lstStyle/>
+            <a:p>
+              <a:pPr algn="ctr"/>
+              <a:endParaRPr lang="en-US"/>
+            </a:p>
+          </p:txBody>
+        </p:sp>
+      </p:grpSp>
+    </p:spTree>
+    <p:extLst>
+      <p:ext uri="{BB962C8B-B14F-4D97-AF65-F5344CB8AC3E}">
+        <p14:creationId xmlns:p14="http://schemas.microsoft.com/office/powerpoint/2010/main" val="3102471655"/>
+      </p:ext>
+    </p:extLst>
+  </p:cSld>
+  <p:clrMapOvr>
+    <a:masterClrMapping/>
+  </p:clrMapOvr>
+</p:sld>
+</file>
+
 <file path=ppt/slides/slide2.xml><?xml version="1.0" encoding="utf-8"?>
 <p:sld xmlns:a="http://schemas.openxmlformats.org/drawingml/2006/main" xmlns:r="http://schemas.openxmlformats.org/officeDocument/2006/relationships" xmlns:p="http://schemas.openxmlformats.org/presentationml/2006/main">
   <p:cSld>
@@ -14536,6 +15678,1263 @@
     <p:extLst>
       <p:ext uri="{BB962C8B-B14F-4D97-AF65-F5344CB8AC3E}">
         <p14:creationId xmlns:p14="http://schemas.microsoft.com/office/powerpoint/2010/main" val="4174864695"/>
+      </p:ext>
+    </p:extLst>
+  </p:cSld>
+  <p:clrMapOvr>
+    <a:masterClrMapping/>
+  </p:clrMapOvr>
+</p:sld>
+</file>
+
+<file path=ppt/slides/slide20.xml><?xml version="1.0" encoding="utf-8"?>
+<p:sld xmlns:a="http://schemas.openxmlformats.org/drawingml/2006/main" xmlns:r="http://schemas.openxmlformats.org/officeDocument/2006/relationships" xmlns:p="http://schemas.openxmlformats.org/presentationml/2006/main">
+  <p:cSld>
+    <p:spTree>
+      <p:nvGrpSpPr>
+        <p:cNvPr id="1" name=""/>
+        <p:cNvGrpSpPr/>
+        <p:nvPr/>
+      </p:nvGrpSpPr>
+      <p:grpSpPr>
+        <a:xfrm>
+          <a:off x="0" y="0"/>
+          <a:ext cx="0" cy="0"/>
+          <a:chOff x="0" y="0"/>
+          <a:chExt cx="0" cy="0"/>
+        </a:xfrm>
+      </p:grpSpPr>
+      <p:sp>
+        <p:nvSpPr>
+          <p:cNvPr id="4" name="Title 1">
+            <a:extLst>
+              <a:ext uri="{FF2B5EF4-FFF2-40B4-BE49-F238E27FC236}">
+                <a16:creationId xmlns:a16="http://schemas.microsoft.com/office/drawing/2014/main" id="{34206686-79E6-4D1A-AFDC-1B08216F2B2C}"/>
+              </a:ext>
+            </a:extLst>
+          </p:cNvPr>
+          <p:cNvSpPr txBox="1">
+            <a:spLocks/>
+          </p:cNvSpPr>
+          <p:nvPr/>
+        </p:nvSpPr>
+        <p:spPr>
+          <a:xfrm>
+            <a:off x="-1" y="18256"/>
+            <a:ext cx="4854747" cy="565944"/>
+          </a:xfrm>
+          <a:prstGeom prst="rect">
+            <a:avLst/>
+          </a:prstGeom>
+        </p:spPr>
+        <p:txBody>
+          <a:bodyPr vert="horz" lIns="91440" tIns="45720" rIns="91440" bIns="45720" rtlCol="0" anchor="ctr">
+            <a:normAutofit/>
+          </a:bodyPr>
+          <a:lstStyle>
+            <a:lvl1pPr algn="l" defTabSz="914400" rtl="0" eaLnBrk="1" latinLnBrk="0" hangingPunct="1">
+              <a:lnSpc>
+                <a:spcPct val="90000"/>
+              </a:lnSpc>
+              <a:spcBef>
+                <a:spcPct val="0"/>
+              </a:spcBef>
+              <a:buNone/>
+              <a:defRPr sz="4400" kern="1200">
+                <a:solidFill>
+                  <a:schemeClr val="tx1"/>
+                </a:solidFill>
+                <a:latin typeface="+mj-lt"/>
+                <a:ea typeface="+mj-ea"/>
+                <a:cs typeface="+mj-cs"/>
+              </a:defRPr>
+            </a:lvl1pPr>
+          </a:lstStyle>
+          <a:p>
+            <a:r>
+              <a:rPr lang="en-US" sz="3200" b="1" i="1" dirty="0">
+                <a:latin typeface="+mn-lt"/>
+              </a:rPr>
+              <a:t>EXAMPLES</a:t>
+            </a:r>
+          </a:p>
+        </p:txBody>
+      </p:sp>
+      <p:grpSp>
+        <p:nvGrpSpPr>
+          <p:cNvPr id="5" name="Group 4">
+            <a:extLst>
+              <a:ext uri="{FF2B5EF4-FFF2-40B4-BE49-F238E27FC236}">
+                <a16:creationId xmlns:a16="http://schemas.microsoft.com/office/drawing/2014/main" id="{06F65281-A2F2-4F88-BCDC-84E1871E957E}"/>
+              </a:ext>
+            </a:extLst>
+          </p:cNvPr>
+          <p:cNvGrpSpPr/>
+          <p:nvPr/>
+        </p:nvGrpSpPr>
+        <p:grpSpPr>
+          <a:xfrm>
+            <a:off x="126640" y="413079"/>
+            <a:ext cx="2704121" cy="4502797"/>
+            <a:chOff x="2002332" y="1429079"/>
+            <a:chExt cx="2704121" cy="4502797"/>
+          </a:xfrm>
+        </p:grpSpPr>
+        <p:grpSp>
+          <p:nvGrpSpPr>
+            <p:cNvPr id="17" name="Group 16">
+              <a:extLst>
+                <a:ext uri="{FF2B5EF4-FFF2-40B4-BE49-F238E27FC236}">
+                  <a16:creationId xmlns:a16="http://schemas.microsoft.com/office/drawing/2014/main" id="{F2163223-4100-4AD2-8F47-E131141ADA69}"/>
+                </a:ext>
+              </a:extLst>
+            </p:cNvPr>
+            <p:cNvGrpSpPr/>
+            <p:nvPr/>
+          </p:nvGrpSpPr>
+          <p:grpSpPr>
+            <a:xfrm>
+              <a:off x="2002332" y="1429079"/>
+              <a:ext cx="2704121" cy="4502797"/>
+              <a:chOff x="134455" y="579180"/>
+              <a:chExt cx="2704121" cy="3569780"/>
+            </a:xfrm>
+          </p:grpSpPr>
+          <p:grpSp>
+            <p:nvGrpSpPr>
+              <p:cNvPr id="16" name="Group 15">
+                <a:extLst>
+                  <a:ext uri="{FF2B5EF4-FFF2-40B4-BE49-F238E27FC236}">
+                    <a16:creationId xmlns:a16="http://schemas.microsoft.com/office/drawing/2014/main" id="{F551B163-F363-48D1-9DD0-9DF1726D95A4}"/>
+                  </a:ext>
+                </a:extLst>
+              </p:cNvPr>
+              <p:cNvGrpSpPr/>
+              <p:nvPr/>
+            </p:nvGrpSpPr>
+            <p:grpSpPr>
+              <a:xfrm>
+                <a:off x="134455" y="579180"/>
+                <a:ext cx="2704121" cy="2828311"/>
+                <a:chOff x="134455" y="579180"/>
+                <a:chExt cx="2704121" cy="2828311"/>
+              </a:xfrm>
+            </p:grpSpPr>
+            <p:sp>
+              <p:nvSpPr>
+                <p:cNvPr id="13" name="Rectangle 3">
+                  <a:extLst>
+                    <a:ext uri="{FF2B5EF4-FFF2-40B4-BE49-F238E27FC236}">
+                      <a16:creationId xmlns:a16="http://schemas.microsoft.com/office/drawing/2014/main" id="{5ADF6B3B-2391-47F0-A38B-487133C168FB}"/>
+                    </a:ext>
+                  </a:extLst>
+                </p:cNvPr>
+                <p:cNvSpPr>
+                  <a:spLocks noChangeArrowheads="1"/>
+                </p:cNvSpPr>
+                <p:nvPr/>
+              </p:nvSpPr>
+              <p:spPr bwMode="auto">
+                <a:xfrm>
+                  <a:off x="184558" y="579180"/>
+                  <a:ext cx="2512276" cy="830997"/>
+                </a:xfrm>
+                <a:prstGeom prst="rect">
+                  <a:avLst/>
+                </a:prstGeom>
+                <a:solidFill>
+                  <a:srgbClr val="FFFFFF"/>
+                </a:solidFill>
+                <a:ln>
+                  <a:noFill/>
+                </a:ln>
+                <a:effectLst/>
+                <a:extLst>
+                  <a:ext uri="{91240B29-F687-4F45-9708-019B960494DF}">
+                    <a14:hiddenLine xmlns:a14="http://schemas.microsoft.com/office/drawing/2010/main" w="9525">
+                      <a:solidFill>
+                        <a:schemeClr val="tx1"/>
+                      </a:solidFill>
+                      <a:miter lim="800000"/>
+                      <a:headEnd/>
+                      <a:tailEnd/>
+                    </a14:hiddenLine>
+                  </a:ext>
+                  <a:ext uri="{AF507438-7753-43E0-B8FC-AC1667EBCBE1}">
+                    <a14:hiddenEffects xmlns:a14="http://schemas.microsoft.com/office/drawing/2010/main">
+                      <a:effectLst>
+                        <a:outerShdw dist="35921" dir="2700000" algn="ctr" rotWithShape="0">
+                          <a:schemeClr val="bg2"/>
+                        </a:outerShdw>
+                      </a:effectLst>
+                    </a14:hiddenEffects>
+                  </a:ext>
+                </a:extLst>
+              </p:spPr>
+              <p:txBody>
+                <a:bodyPr vert="horz" wrap="square" lIns="91440" tIns="45720" rIns="91440" bIns="45720" numCol="1" anchor="ctr" anchorCtr="0" compatLnSpc="1">
+                  <a:prstTxWarp prst="textNoShape">
+                    <a:avLst/>
+                  </a:prstTxWarp>
+                  <a:spAutoFit/>
+                </a:bodyPr>
+                <a:lstStyle>
+                  <a:lvl1pPr eaLnBrk="0" fontAlgn="base" hangingPunct="0">
+                    <a:spcBef>
+                      <a:spcPct val="0"/>
+                    </a:spcBef>
+                    <a:spcAft>
+                      <a:spcPct val="0"/>
+                    </a:spcAft>
+                    <a:defRPr>
+                      <a:solidFill>
+                        <a:schemeClr val="tx1"/>
+                      </a:solidFill>
+                      <a:latin typeface="Arial" panose="020B0604020202020204" pitchFamily="34" charset="0"/>
+                    </a:defRPr>
+                  </a:lvl1pPr>
+                  <a:lvl2pPr eaLnBrk="0" fontAlgn="base" hangingPunct="0">
+                    <a:spcBef>
+                      <a:spcPct val="0"/>
+                    </a:spcBef>
+                    <a:spcAft>
+                      <a:spcPct val="0"/>
+                    </a:spcAft>
+                    <a:defRPr>
+                      <a:solidFill>
+                        <a:schemeClr val="tx1"/>
+                      </a:solidFill>
+                      <a:latin typeface="Arial" panose="020B0604020202020204" pitchFamily="34" charset="0"/>
+                    </a:defRPr>
+                  </a:lvl2pPr>
+                  <a:lvl3pPr eaLnBrk="0" fontAlgn="base" hangingPunct="0">
+                    <a:spcBef>
+                      <a:spcPct val="0"/>
+                    </a:spcBef>
+                    <a:spcAft>
+                      <a:spcPct val="0"/>
+                    </a:spcAft>
+                    <a:defRPr>
+                      <a:solidFill>
+                        <a:schemeClr val="tx1"/>
+                      </a:solidFill>
+                      <a:latin typeface="Arial" panose="020B0604020202020204" pitchFamily="34" charset="0"/>
+                    </a:defRPr>
+                  </a:lvl3pPr>
+                  <a:lvl4pPr eaLnBrk="0" fontAlgn="base" hangingPunct="0">
+                    <a:spcBef>
+                      <a:spcPct val="0"/>
+                    </a:spcBef>
+                    <a:spcAft>
+                      <a:spcPct val="0"/>
+                    </a:spcAft>
+                    <a:defRPr>
+                      <a:solidFill>
+                        <a:schemeClr val="tx1"/>
+                      </a:solidFill>
+                      <a:latin typeface="Arial" panose="020B0604020202020204" pitchFamily="34" charset="0"/>
+                    </a:defRPr>
+                  </a:lvl4pPr>
+                  <a:lvl5pPr eaLnBrk="0" fontAlgn="base" hangingPunct="0">
+                    <a:spcBef>
+                      <a:spcPct val="0"/>
+                    </a:spcBef>
+                    <a:spcAft>
+                      <a:spcPct val="0"/>
+                    </a:spcAft>
+                    <a:defRPr>
+                      <a:solidFill>
+                        <a:schemeClr val="tx1"/>
+                      </a:solidFill>
+                      <a:latin typeface="Arial" panose="020B0604020202020204" pitchFamily="34" charset="0"/>
+                    </a:defRPr>
+                  </a:lvl5pPr>
+                  <a:lvl6pPr eaLnBrk="0" fontAlgn="base" hangingPunct="0">
+                    <a:spcBef>
+                      <a:spcPct val="0"/>
+                    </a:spcBef>
+                    <a:spcAft>
+                      <a:spcPct val="0"/>
+                    </a:spcAft>
+                    <a:defRPr>
+                      <a:solidFill>
+                        <a:schemeClr val="tx1"/>
+                      </a:solidFill>
+                      <a:latin typeface="Arial" panose="020B0604020202020204" pitchFamily="34" charset="0"/>
+                    </a:defRPr>
+                  </a:lvl6pPr>
+                  <a:lvl7pPr eaLnBrk="0" fontAlgn="base" hangingPunct="0">
+                    <a:spcBef>
+                      <a:spcPct val="0"/>
+                    </a:spcBef>
+                    <a:spcAft>
+                      <a:spcPct val="0"/>
+                    </a:spcAft>
+                    <a:defRPr>
+                      <a:solidFill>
+                        <a:schemeClr val="tx1"/>
+                      </a:solidFill>
+                      <a:latin typeface="Arial" panose="020B0604020202020204" pitchFamily="34" charset="0"/>
+                    </a:defRPr>
+                  </a:lvl7pPr>
+                  <a:lvl8pPr eaLnBrk="0" fontAlgn="base" hangingPunct="0">
+                    <a:spcBef>
+                      <a:spcPct val="0"/>
+                    </a:spcBef>
+                    <a:spcAft>
+                      <a:spcPct val="0"/>
+                    </a:spcAft>
+                    <a:defRPr>
+                      <a:solidFill>
+                        <a:schemeClr val="tx1"/>
+                      </a:solidFill>
+                      <a:latin typeface="Arial" panose="020B0604020202020204" pitchFamily="34" charset="0"/>
+                    </a:defRPr>
+                  </a:lvl8pPr>
+                  <a:lvl9pPr eaLnBrk="0" fontAlgn="base" hangingPunct="0">
+                    <a:spcBef>
+                      <a:spcPct val="0"/>
+                    </a:spcBef>
+                    <a:spcAft>
+                      <a:spcPct val="0"/>
+                    </a:spcAft>
+                    <a:defRPr>
+                      <a:solidFill>
+                        <a:schemeClr val="tx1"/>
+                      </a:solidFill>
+                      <a:latin typeface="Arial" panose="020B0604020202020204" pitchFamily="34" charset="0"/>
+                    </a:defRPr>
+                  </a:lvl9pPr>
+                </a:lstStyle>
+                <a:p>
+                  <a:pPr lvl="0"/>
+                  <a:r>
+                    <a:rPr kumimoji="0" lang="en-US" altLang="en-US" sz="1200" b="1" i="0" u="none" strike="noStrike" cap="none" normalizeH="0" baseline="0" dirty="0" err="1">
+                      <a:ln>
+                        <a:noFill/>
+                      </a:ln>
+                      <a:solidFill>
+                        <a:srgbClr val="222222"/>
+                      </a:solidFill>
+                      <a:effectLst/>
+                      <a:latin typeface="+mn-lt"/>
+                    </a:rPr>
+                    <a:t>Контекст</a:t>
+                  </a:r>
+                  <a:r>
+                    <a:rPr kumimoji="0" lang="en-US" altLang="en-US" sz="1200" b="1" i="0" u="none" strike="noStrike" cap="none" normalizeH="0" baseline="0" dirty="0">
+                      <a:ln>
+                        <a:noFill/>
+                      </a:ln>
+                      <a:solidFill>
+                        <a:srgbClr val="222222"/>
+                      </a:solidFill>
+                      <a:effectLst/>
+                      <a:latin typeface="+mn-lt"/>
+                    </a:rPr>
+                    <a:t>:</a:t>
+                  </a:r>
+                  <a:r>
+                    <a:rPr kumimoji="0" lang="en-US" altLang="en-US" sz="1200" b="0" i="0" u="none" strike="noStrike" cap="none" normalizeH="0" baseline="0" dirty="0">
+                      <a:ln>
+                        <a:noFill/>
+                      </a:ln>
+                      <a:solidFill>
+                        <a:srgbClr val="222222"/>
+                      </a:solidFill>
+                      <a:effectLst/>
+                      <a:latin typeface="+mn-lt"/>
+                    </a:rPr>
+                    <a:t> </a:t>
+                  </a:r>
+                  <a:r>
+                    <a:rPr lang="ru-RU" altLang="en-US" sz="1200" dirty="0">
+                      <a:solidFill>
+                        <a:srgbClr val="222222"/>
+                      </a:solidFill>
+                      <a:latin typeface="+mn-lt"/>
+                    </a:rPr>
+                    <a:t>предположим, у вас есть таблица tree с двумя столбцами: в первом указаны узлы, а во втором — родительские узлы.</a:t>
+                  </a:r>
+                  <a:endParaRPr kumimoji="0" lang="en-US" altLang="en-US" sz="1200" b="0" i="0" u="none" strike="noStrike" cap="none" normalizeH="0" baseline="0" dirty="0">
+                    <a:ln>
+                      <a:noFill/>
+                    </a:ln>
+                    <a:solidFill>
+                      <a:schemeClr val="tx1"/>
+                    </a:solidFill>
+                    <a:effectLst/>
+                    <a:latin typeface="+mn-lt"/>
+                  </a:endParaRPr>
+                </a:p>
+              </p:txBody>
+            </p:sp>
+            <p:sp>
+              <p:nvSpPr>
+                <p:cNvPr id="14" name="Rectangle 13">
+                  <a:extLst>
+                    <a:ext uri="{FF2B5EF4-FFF2-40B4-BE49-F238E27FC236}">
+                      <a16:creationId xmlns:a16="http://schemas.microsoft.com/office/drawing/2014/main" id="{E9AAF8C1-EA12-4A6B-A2D0-F643C4B88AA4}"/>
+                    </a:ext>
+                  </a:extLst>
+                </p:cNvPr>
+                <p:cNvSpPr/>
+                <p:nvPr/>
+              </p:nvSpPr>
+              <p:spPr>
+                <a:xfrm>
+                  <a:off x="134455" y="2207162"/>
+                  <a:ext cx="2704121" cy="1200329"/>
+                </a:xfrm>
+                <a:prstGeom prst="rect">
+                  <a:avLst/>
+                </a:prstGeom>
+              </p:spPr>
+              <p:txBody>
+                <a:bodyPr wrap="square">
+                  <a:spAutoFit/>
+                </a:bodyPr>
+                <a:lstStyle/>
+                <a:p>
+                  <a:r>
+                    <a:rPr lang="en-US" sz="1200" b="1" dirty="0" err="1"/>
+                    <a:t>Задача</a:t>
+                  </a:r>
+                  <a:r>
+                    <a:rPr lang="en-US" sz="1200" b="1" dirty="0"/>
+                    <a:t>: </a:t>
+                  </a:r>
+                  <a:r>
+                    <a:rPr lang="ru-RU" sz="1200" dirty="0"/>
+                    <a:t>написать SQL таким образом, чтобы мы обозначили каждый узел как внутренний (inner), корневой (root) или конечный узел/лист (leaf), так что для вышеперечисленных значений получится следующее:</a:t>
+                  </a:r>
+                  <a:endParaRPr lang="en-US" sz="1200" dirty="0"/>
+                </a:p>
+              </p:txBody>
+            </p:sp>
+          </p:grpSp>
+          <p:sp>
+            <p:nvSpPr>
+              <p:cNvPr id="10" name="Rectangle 9">
+                <a:extLst>
+                  <a:ext uri="{FF2B5EF4-FFF2-40B4-BE49-F238E27FC236}">
+                    <a16:creationId xmlns:a16="http://schemas.microsoft.com/office/drawing/2014/main" id="{613FCF3A-D373-44CE-B3FD-ED391B2BCBF7}"/>
+                  </a:ext>
+                </a:extLst>
+              </p:cNvPr>
+              <p:cNvSpPr/>
+              <p:nvPr/>
+            </p:nvSpPr>
+            <p:spPr>
+              <a:xfrm>
+                <a:off x="184558" y="706352"/>
+                <a:ext cx="2512276" cy="3442608"/>
+              </a:xfrm>
+              <a:prstGeom prst="rect">
+                <a:avLst/>
+              </a:prstGeom>
+              <a:noFill/>
+            </p:spPr>
+            <p:style>
+              <a:lnRef idx="2">
+                <a:schemeClr val="accent1">
+                  <a:shade val="50000"/>
+                </a:schemeClr>
+              </a:lnRef>
+              <a:fillRef idx="1">
+                <a:schemeClr val="accent1"/>
+              </a:fillRef>
+              <a:effectRef idx="0">
+                <a:schemeClr val="accent1"/>
+              </a:effectRef>
+              <a:fontRef idx="minor">
+                <a:schemeClr val="lt1"/>
+              </a:fontRef>
+            </p:style>
+            <p:txBody>
+              <a:bodyPr rtlCol="0" anchor="ctr"/>
+              <a:lstStyle/>
+              <a:p>
+                <a:pPr algn="ctr"/>
+                <a:endParaRPr lang="en-US"/>
+              </a:p>
+            </p:txBody>
+          </p:sp>
+        </p:grpSp>
+        <p:pic>
+          <p:nvPicPr>
+            <p:cNvPr id="2" name="Picture 1">
+              <a:extLst>
+                <a:ext uri="{FF2B5EF4-FFF2-40B4-BE49-F238E27FC236}">
+                  <a16:creationId xmlns:a16="http://schemas.microsoft.com/office/drawing/2014/main" id="{557B250F-3FF1-43AF-B170-D9BAD5DF51F9}"/>
+                </a:ext>
+              </a:extLst>
+            </p:cNvPr>
+            <p:cNvPicPr>
+              <a:picLocks noChangeAspect="1"/>
+            </p:cNvPicPr>
+            <p:nvPr/>
+          </p:nvPicPr>
+          <p:blipFill>
+            <a:blip r:embed="rId2"/>
+            <a:stretch>
+              <a:fillRect/>
+            </a:stretch>
+          </p:blipFill>
+          <p:spPr>
+            <a:xfrm>
+              <a:off x="2724357" y="2313369"/>
+              <a:ext cx="950620" cy="1062072"/>
+            </a:xfrm>
+            <a:prstGeom prst="rect">
+              <a:avLst/>
+            </a:prstGeom>
+          </p:spPr>
+        </p:pic>
+        <p:pic>
+          <p:nvPicPr>
+            <p:cNvPr id="3" name="Picture 2">
+              <a:extLst>
+                <a:ext uri="{FF2B5EF4-FFF2-40B4-BE49-F238E27FC236}">
+                  <a16:creationId xmlns:a16="http://schemas.microsoft.com/office/drawing/2014/main" id="{A502B650-9CB9-4D8B-B54E-0A48AA69DBA3}"/>
+                </a:ext>
+              </a:extLst>
+            </p:cNvPr>
+            <p:cNvPicPr>
+              <a:picLocks noChangeAspect="1"/>
+            </p:cNvPicPr>
+            <p:nvPr/>
+          </p:nvPicPr>
+          <p:blipFill>
+            <a:blip r:embed="rId3"/>
+            <a:stretch>
+              <a:fillRect/>
+            </a:stretch>
+          </p:blipFill>
+          <p:spPr>
+            <a:xfrm>
+              <a:off x="2724357" y="4717447"/>
+              <a:ext cx="955691" cy="1102127"/>
+            </a:xfrm>
+            <a:prstGeom prst="rect">
+              <a:avLst/>
+            </a:prstGeom>
+          </p:spPr>
+        </p:pic>
+      </p:grpSp>
+      <p:pic>
+        <p:nvPicPr>
+          <p:cNvPr id="6" name="Picture 5">
+            <a:extLst>
+              <a:ext uri="{FF2B5EF4-FFF2-40B4-BE49-F238E27FC236}">
+                <a16:creationId xmlns:a16="http://schemas.microsoft.com/office/drawing/2014/main" id="{B2FAE744-3169-449B-AC97-1FA284BC5C5A}"/>
+              </a:ext>
+            </a:extLst>
+          </p:cNvPr>
+          <p:cNvPicPr>
+            <a:picLocks noChangeAspect="1"/>
+          </p:cNvPicPr>
+          <p:nvPr/>
+        </p:nvPicPr>
+        <p:blipFill>
+          <a:blip r:embed="rId4"/>
+          <a:stretch>
+            <a:fillRect/>
+          </a:stretch>
+        </p:blipFill>
+        <p:spPr>
+          <a:xfrm>
+            <a:off x="2959271" y="573489"/>
+            <a:ext cx="3790950" cy="5657850"/>
+          </a:xfrm>
+          <a:prstGeom prst="rect">
+            <a:avLst/>
+          </a:prstGeom>
+        </p:spPr>
+      </p:pic>
+      <p:sp>
+        <p:nvSpPr>
+          <p:cNvPr id="8" name="Right Brace 7">
+            <a:extLst>
+              <a:ext uri="{FF2B5EF4-FFF2-40B4-BE49-F238E27FC236}">
+                <a16:creationId xmlns:a16="http://schemas.microsoft.com/office/drawing/2014/main" id="{4B51B32C-6A7E-4056-B5F4-E41A81A27BB8}"/>
+              </a:ext>
+            </a:extLst>
+          </p:cNvPr>
+          <p:cNvSpPr/>
+          <p:nvPr/>
+        </p:nvSpPr>
+        <p:spPr>
+          <a:xfrm>
+            <a:off x="6750221" y="1990725"/>
+            <a:ext cx="719060" cy="981075"/>
+          </a:xfrm>
+          <a:prstGeom prst="rightBrace">
+            <a:avLst>
+              <a:gd name="adj1" fmla="val 8333"/>
+              <a:gd name="adj2" fmla="val 50971"/>
+            </a:avLst>
+          </a:prstGeom>
+        </p:spPr>
+        <p:style>
+          <a:lnRef idx="1">
+            <a:schemeClr val="accent1"/>
+          </a:lnRef>
+          <a:fillRef idx="0">
+            <a:schemeClr val="accent1"/>
+          </a:fillRef>
+          <a:effectRef idx="0">
+            <a:schemeClr val="accent1"/>
+          </a:effectRef>
+          <a:fontRef idx="minor">
+            <a:schemeClr val="tx1"/>
+          </a:fontRef>
+        </p:style>
+        <p:txBody>
+          <a:bodyPr rtlCol="0" anchor="ctr"/>
+          <a:lstStyle/>
+          <a:p>
+            <a:pPr algn="ctr"/>
+            <a:endParaRPr lang="en-US"/>
+          </a:p>
+        </p:txBody>
+      </p:sp>
+      <p:pic>
+        <p:nvPicPr>
+          <p:cNvPr id="18" name="Picture 17">
+            <a:extLst>
+              <a:ext uri="{FF2B5EF4-FFF2-40B4-BE49-F238E27FC236}">
+                <a16:creationId xmlns:a16="http://schemas.microsoft.com/office/drawing/2014/main" id="{8B64DFDA-9EA0-43F6-9D1A-67F994FA58EE}"/>
+              </a:ext>
+            </a:extLst>
+          </p:cNvPr>
+          <p:cNvPicPr>
+            <a:picLocks noChangeAspect="1"/>
+          </p:cNvPicPr>
+          <p:nvPr/>
+        </p:nvPicPr>
+        <p:blipFill>
+          <a:blip r:embed="rId2"/>
+          <a:stretch>
+            <a:fillRect/>
+          </a:stretch>
+        </p:blipFill>
+        <p:spPr>
+          <a:xfrm>
+            <a:off x="7639990" y="1909728"/>
+            <a:ext cx="950620" cy="1062072"/>
+          </a:xfrm>
+          <a:prstGeom prst="rect">
+            <a:avLst/>
+          </a:prstGeom>
+        </p:spPr>
+      </p:pic>
+      <p:pic>
+        <p:nvPicPr>
+          <p:cNvPr id="19" name="Picture 18">
+            <a:extLst>
+              <a:ext uri="{FF2B5EF4-FFF2-40B4-BE49-F238E27FC236}">
+                <a16:creationId xmlns:a16="http://schemas.microsoft.com/office/drawing/2014/main" id="{70619C1C-2682-4C8F-89F0-F8924D7FD739}"/>
+              </a:ext>
+            </a:extLst>
+          </p:cNvPr>
+          <p:cNvPicPr>
+            <a:picLocks noChangeAspect="1"/>
+          </p:cNvPicPr>
+          <p:nvPr/>
+        </p:nvPicPr>
+        <p:blipFill>
+          <a:blip r:embed="rId2"/>
+          <a:stretch>
+            <a:fillRect/>
+          </a:stretch>
+        </p:blipFill>
+        <p:spPr>
+          <a:xfrm>
+            <a:off x="8878240" y="1909728"/>
+            <a:ext cx="950620" cy="1062072"/>
+          </a:xfrm>
+          <a:prstGeom prst="rect">
+            <a:avLst/>
+          </a:prstGeom>
+        </p:spPr>
+      </p:pic>
+      <p:cxnSp>
+        <p:nvCxnSpPr>
+          <p:cNvPr id="26" name="Straight Arrow Connector 25">
+            <a:extLst>
+              <a:ext uri="{FF2B5EF4-FFF2-40B4-BE49-F238E27FC236}">
+                <a16:creationId xmlns:a16="http://schemas.microsoft.com/office/drawing/2014/main" id="{54A96697-5591-46AD-8BDA-8A974B030209}"/>
+              </a:ext>
+            </a:extLst>
+          </p:cNvPr>
+          <p:cNvCxnSpPr/>
+          <p:nvPr/>
+        </p:nvCxnSpPr>
+        <p:spPr>
+          <a:xfrm>
+            <a:off x="7791450" y="1461270"/>
+            <a:ext cx="0" cy="448458"/>
+          </a:xfrm>
+          <a:prstGeom prst="straightConnector1">
+            <a:avLst/>
+          </a:prstGeom>
+          <a:ln>
+            <a:tailEnd type="triangle"/>
+          </a:ln>
+        </p:spPr>
+        <p:style>
+          <a:lnRef idx="1">
+            <a:schemeClr val="accent1"/>
+          </a:lnRef>
+          <a:fillRef idx="0">
+            <a:schemeClr val="accent1"/>
+          </a:fillRef>
+          <a:effectRef idx="0">
+            <a:schemeClr val="accent1"/>
+          </a:effectRef>
+          <a:fontRef idx="minor">
+            <a:schemeClr val="tx1"/>
+          </a:fontRef>
+        </p:style>
+      </p:cxnSp>
+      <p:cxnSp>
+        <p:nvCxnSpPr>
+          <p:cNvPr id="28" name="Connector: Elbow 27">
+            <a:extLst>
+              <a:ext uri="{FF2B5EF4-FFF2-40B4-BE49-F238E27FC236}">
+                <a16:creationId xmlns:a16="http://schemas.microsoft.com/office/drawing/2014/main" id="{118D1368-0690-4F0C-9385-454AC316787B}"/>
+              </a:ext>
+            </a:extLst>
+          </p:cNvPr>
+          <p:cNvCxnSpPr/>
+          <p:nvPr/>
+        </p:nvCxnSpPr>
+        <p:spPr>
+          <a:xfrm>
+            <a:off x="7800975" y="1461270"/>
+            <a:ext cx="1800225" cy="448458"/>
+          </a:xfrm>
+          <a:prstGeom prst="bentConnector3">
+            <a:avLst>
+              <a:gd name="adj1" fmla="val 99735"/>
+            </a:avLst>
+          </a:prstGeom>
+        </p:spPr>
+        <p:style>
+          <a:lnRef idx="1">
+            <a:schemeClr val="accent1"/>
+          </a:lnRef>
+          <a:fillRef idx="0">
+            <a:schemeClr val="accent1"/>
+          </a:fillRef>
+          <a:effectRef idx="0">
+            <a:schemeClr val="accent1"/>
+          </a:effectRef>
+          <a:fontRef idx="minor">
+            <a:schemeClr val="tx1"/>
+          </a:fontRef>
+        </p:style>
+      </p:cxnSp>
+      <p:sp>
+        <p:nvSpPr>
+          <p:cNvPr id="30" name="Rectangle 29">
+            <a:extLst>
+              <a:ext uri="{FF2B5EF4-FFF2-40B4-BE49-F238E27FC236}">
+                <a16:creationId xmlns:a16="http://schemas.microsoft.com/office/drawing/2014/main" id="{36AE2953-7A33-4DCC-8C5D-8A726B1B48F9}"/>
+              </a:ext>
+            </a:extLst>
+          </p:cNvPr>
+          <p:cNvSpPr/>
+          <p:nvPr/>
+        </p:nvSpPr>
+        <p:spPr>
+          <a:xfrm>
+            <a:off x="7572375" y="1909728"/>
+            <a:ext cx="1078196" cy="1062072"/>
+          </a:xfrm>
+          <a:prstGeom prst="rect">
+            <a:avLst/>
+          </a:prstGeom>
+          <a:noFill/>
+        </p:spPr>
+        <p:style>
+          <a:lnRef idx="2">
+            <a:schemeClr val="accent1">
+              <a:shade val="50000"/>
+            </a:schemeClr>
+          </a:lnRef>
+          <a:fillRef idx="1">
+            <a:schemeClr val="accent1"/>
+          </a:fillRef>
+          <a:effectRef idx="0">
+            <a:schemeClr val="accent1"/>
+          </a:effectRef>
+          <a:fontRef idx="minor">
+            <a:schemeClr val="lt1"/>
+          </a:fontRef>
+        </p:style>
+        <p:txBody>
+          <a:bodyPr rtlCol="0" anchor="ctr"/>
+          <a:lstStyle/>
+          <a:p>
+            <a:pPr algn="ctr"/>
+            <a:endParaRPr lang="en-US"/>
+          </a:p>
+        </p:txBody>
+      </p:sp>
+      <p:sp>
+        <p:nvSpPr>
+          <p:cNvPr id="31" name="Rectangle 30">
+            <a:extLst>
+              <a:ext uri="{FF2B5EF4-FFF2-40B4-BE49-F238E27FC236}">
+                <a16:creationId xmlns:a16="http://schemas.microsoft.com/office/drawing/2014/main" id="{B137BF9B-ACDF-47C9-8DDC-B952465339C5}"/>
+              </a:ext>
+            </a:extLst>
+          </p:cNvPr>
+          <p:cNvSpPr/>
+          <p:nvPr/>
+        </p:nvSpPr>
+        <p:spPr>
+          <a:xfrm>
+            <a:off x="8832680" y="1909728"/>
+            <a:ext cx="1078196" cy="1062072"/>
+          </a:xfrm>
+          <a:prstGeom prst="rect">
+            <a:avLst/>
+          </a:prstGeom>
+          <a:noFill/>
+        </p:spPr>
+        <p:style>
+          <a:lnRef idx="2">
+            <a:schemeClr val="accent1">
+              <a:shade val="50000"/>
+            </a:schemeClr>
+          </a:lnRef>
+          <a:fillRef idx="1">
+            <a:schemeClr val="accent1"/>
+          </a:fillRef>
+          <a:effectRef idx="0">
+            <a:schemeClr val="accent1"/>
+          </a:effectRef>
+          <a:fontRef idx="minor">
+            <a:schemeClr val="lt1"/>
+          </a:fontRef>
+        </p:style>
+        <p:txBody>
+          <a:bodyPr rtlCol="0" anchor="ctr"/>
+          <a:lstStyle/>
+          <a:p>
+            <a:pPr algn="ctr"/>
+            <a:endParaRPr lang="en-US"/>
+          </a:p>
+        </p:txBody>
+      </p:sp>
+      <p:sp>
+        <p:nvSpPr>
+          <p:cNvPr id="32" name="TextBox 31">
+            <a:extLst>
+              <a:ext uri="{FF2B5EF4-FFF2-40B4-BE49-F238E27FC236}">
+                <a16:creationId xmlns:a16="http://schemas.microsoft.com/office/drawing/2014/main" id="{8132D481-3112-45FA-A731-9BA32A1BC555}"/>
+              </a:ext>
+            </a:extLst>
+          </p:cNvPr>
+          <p:cNvSpPr txBox="1"/>
+          <p:nvPr/>
+        </p:nvSpPr>
+        <p:spPr>
+          <a:xfrm>
+            <a:off x="7913054" y="1651768"/>
+            <a:ext cx="383438" cy="276999"/>
+          </a:xfrm>
+          <a:prstGeom prst="rect">
+            <a:avLst/>
+          </a:prstGeom>
+          <a:noFill/>
+        </p:spPr>
+        <p:txBody>
+          <a:bodyPr wrap="none" rtlCol="0">
+            <a:spAutoFit/>
+          </a:bodyPr>
+          <a:lstStyle/>
+          <a:p>
+            <a:r>
+              <a:rPr lang="en-US" sz="1200" b="1" dirty="0"/>
+              <a:t>cur</a:t>
+            </a:r>
+          </a:p>
+        </p:txBody>
+      </p:sp>
+      <p:sp>
+        <p:nvSpPr>
+          <p:cNvPr id="33" name="TextBox 32">
+            <a:extLst>
+              <a:ext uri="{FF2B5EF4-FFF2-40B4-BE49-F238E27FC236}">
+                <a16:creationId xmlns:a16="http://schemas.microsoft.com/office/drawing/2014/main" id="{9744FB03-98C1-4A55-AAB3-C8AB9468A2DA}"/>
+              </a:ext>
+            </a:extLst>
+          </p:cNvPr>
+          <p:cNvSpPr txBox="1"/>
+          <p:nvPr/>
+        </p:nvSpPr>
+        <p:spPr>
+          <a:xfrm>
+            <a:off x="9079529" y="1651769"/>
+            <a:ext cx="465961" cy="276999"/>
+          </a:xfrm>
+          <a:prstGeom prst="rect">
+            <a:avLst/>
+          </a:prstGeom>
+          <a:noFill/>
+        </p:spPr>
+        <p:txBody>
+          <a:bodyPr wrap="none" rtlCol="0">
+            <a:spAutoFit/>
+          </a:bodyPr>
+          <a:lstStyle/>
+          <a:p>
+            <a:r>
+              <a:rPr lang="en-US" sz="1200" b="1" dirty="0"/>
+              <a:t>next</a:t>
+            </a:r>
+          </a:p>
+        </p:txBody>
+      </p:sp>
+      <p:sp>
+        <p:nvSpPr>
+          <p:cNvPr id="34" name="Arrow: Down 33">
+            <a:extLst>
+              <a:ext uri="{FF2B5EF4-FFF2-40B4-BE49-F238E27FC236}">
+                <a16:creationId xmlns:a16="http://schemas.microsoft.com/office/drawing/2014/main" id="{6BF0FBF8-9DD9-465E-A7DE-FBD8394E24BE}"/>
+              </a:ext>
+            </a:extLst>
+          </p:cNvPr>
+          <p:cNvSpPr/>
+          <p:nvPr/>
+        </p:nvSpPr>
+        <p:spPr>
+          <a:xfrm rot="10800000">
+            <a:off x="8674383" y="930862"/>
+            <a:ext cx="143815" cy="448458"/>
+          </a:xfrm>
+          <a:prstGeom prst="downArrow">
+            <a:avLst/>
+          </a:prstGeom>
+        </p:spPr>
+        <p:style>
+          <a:lnRef idx="2">
+            <a:schemeClr val="accent1">
+              <a:shade val="50000"/>
+            </a:schemeClr>
+          </a:lnRef>
+          <a:fillRef idx="1">
+            <a:schemeClr val="accent1"/>
+          </a:fillRef>
+          <a:effectRef idx="0">
+            <a:schemeClr val="accent1"/>
+          </a:effectRef>
+          <a:fontRef idx="minor">
+            <a:schemeClr val="lt1"/>
+          </a:fontRef>
+        </p:style>
+        <p:txBody>
+          <a:bodyPr rtlCol="0" anchor="ctr"/>
+          <a:lstStyle/>
+          <a:p>
+            <a:pPr algn="ctr"/>
+            <a:endParaRPr lang="en-US"/>
+          </a:p>
+        </p:txBody>
+      </p:sp>
+      <p:sp>
+        <p:nvSpPr>
+          <p:cNvPr id="35" name="TextBox 34">
+            <a:extLst>
+              <a:ext uri="{FF2B5EF4-FFF2-40B4-BE49-F238E27FC236}">
+                <a16:creationId xmlns:a16="http://schemas.microsoft.com/office/drawing/2014/main" id="{74E63146-894F-4F04-9D61-4B37C0702047}"/>
+              </a:ext>
+            </a:extLst>
+          </p:cNvPr>
+          <p:cNvSpPr txBox="1"/>
+          <p:nvPr/>
+        </p:nvSpPr>
+        <p:spPr>
+          <a:xfrm>
+            <a:off x="8031524" y="243556"/>
+            <a:ext cx="1429531" cy="646331"/>
+          </a:xfrm>
+          <a:prstGeom prst="rect">
+            <a:avLst/>
+          </a:prstGeom>
+          <a:noFill/>
+        </p:spPr>
+        <p:txBody>
+          <a:bodyPr wrap="square" rtlCol="0">
+            <a:spAutoFit/>
+          </a:bodyPr>
+          <a:lstStyle/>
+          <a:p>
+            <a:pPr algn="r"/>
+            <a:r>
+              <a:rPr lang="en-US" sz="1200" b="1" i="1" dirty="0" err="1"/>
+              <a:t>next.node</a:t>
+            </a:r>
+            <a:r>
+              <a:rPr lang="en-US" sz="1200" b="1" i="1" dirty="0"/>
+              <a:t> </a:t>
+            </a:r>
+          </a:p>
+          <a:p>
+            <a:pPr algn="ctr"/>
+            <a:r>
+              <a:rPr lang="en-US" sz="1200" dirty="0"/>
+              <a:t>becomes </a:t>
+            </a:r>
+          </a:p>
+          <a:p>
+            <a:r>
+              <a:rPr lang="en-US" sz="1200" b="1" i="1" dirty="0" err="1"/>
+              <a:t>cur.child</a:t>
+            </a:r>
+            <a:endParaRPr lang="en-US" sz="1200" b="1" i="1" dirty="0"/>
+          </a:p>
+        </p:txBody>
+      </p:sp>
+      <p:cxnSp>
+        <p:nvCxnSpPr>
+          <p:cNvPr id="37" name="Straight Connector 36">
+            <a:extLst>
+              <a:ext uri="{FF2B5EF4-FFF2-40B4-BE49-F238E27FC236}">
+                <a16:creationId xmlns:a16="http://schemas.microsoft.com/office/drawing/2014/main" id="{9F42EFF6-AF23-4A79-A9C8-7166F2115FF2}"/>
+              </a:ext>
+            </a:extLst>
+          </p:cNvPr>
+          <p:cNvCxnSpPr/>
+          <p:nvPr/>
+        </p:nvCxnSpPr>
+        <p:spPr>
+          <a:xfrm>
+            <a:off x="3209925" y="2019300"/>
+            <a:ext cx="3324225" cy="0"/>
+          </a:xfrm>
+          <a:prstGeom prst="line">
+            <a:avLst/>
+          </a:prstGeom>
+          <a:ln>
+            <a:prstDash val="dash"/>
+          </a:ln>
+        </p:spPr>
+        <p:style>
+          <a:lnRef idx="1">
+            <a:schemeClr val="accent1"/>
+          </a:lnRef>
+          <a:fillRef idx="0">
+            <a:schemeClr val="accent1"/>
+          </a:fillRef>
+          <a:effectRef idx="0">
+            <a:schemeClr val="accent1"/>
+          </a:effectRef>
+          <a:fontRef idx="minor">
+            <a:schemeClr val="tx1"/>
+          </a:fontRef>
+        </p:style>
+      </p:cxnSp>
+      <p:cxnSp>
+        <p:nvCxnSpPr>
+          <p:cNvPr id="38" name="Straight Connector 37">
+            <a:extLst>
+              <a:ext uri="{FF2B5EF4-FFF2-40B4-BE49-F238E27FC236}">
+                <a16:creationId xmlns:a16="http://schemas.microsoft.com/office/drawing/2014/main" id="{9589CDF6-C77E-41A0-9FB5-17808EFE4047}"/>
+              </a:ext>
+            </a:extLst>
+          </p:cNvPr>
+          <p:cNvCxnSpPr/>
+          <p:nvPr/>
+        </p:nvCxnSpPr>
+        <p:spPr>
+          <a:xfrm>
+            <a:off x="3209925" y="2924175"/>
+            <a:ext cx="3324225" cy="0"/>
+          </a:xfrm>
+          <a:prstGeom prst="line">
+            <a:avLst/>
+          </a:prstGeom>
+          <a:ln>
+            <a:prstDash val="dash"/>
+          </a:ln>
+        </p:spPr>
+        <p:style>
+          <a:lnRef idx="1">
+            <a:schemeClr val="accent1"/>
+          </a:lnRef>
+          <a:fillRef idx="0">
+            <a:schemeClr val="accent1"/>
+          </a:fillRef>
+          <a:effectRef idx="0">
+            <a:schemeClr val="accent1"/>
+          </a:effectRef>
+          <a:fontRef idx="minor">
+            <a:schemeClr val="tx1"/>
+          </a:fontRef>
+        </p:style>
+      </p:cxnSp>
+      <p:pic>
+        <p:nvPicPr>
+          <p:cNvPr id="39" name="Picture 38">
+            <a:extLst>
+              <a:ext uri="{FF2B5EF4-FFF2-40B4-BE49-F238E27FC236}">
+                <a16:creationId xmlns:a16="http://schemas.microsoft.com/office/drawing/2014/main" id="{70C2311A-AF66-4929-B3E3-CA2DC48D67B3}"/>
+              </a:ext>
+            </a:extLst>
+          </p:cNvPr>
+          <p:cNvPicPr>
+            <a:picLocks noChangeAspect="1"/>
+          </p:cNvPicPr>
+          <p:nvPr/>
+        </p:nvPicPr>
+        <p:blipFill>
+          <a:blip r:embed="rId5"/>
+          <a:stretch>
+            <a:fillRect/>
+          </a:stretch>
+        </p:blipFill>
+        <p:spPr>
+          <a:xfrm>
+            <a:off x="7096404" y="4641425"/>
+            <a:ext cx="5009592" cy="2023394"/>
+          </a:xfrm>
+          <a:prstGeom prst="rect">
+            <a:avLst/>
+          </a:prstGeom>
+          <a:ln>
+            <a:solidFill>
+              <a:schemeClr val="accent1"/>
+            </a:solidFill>
+          </a:ln>
+        </p:spPr>
+      </p:pic>
+      <p:sp>
+        <p:nvSpPr>
+          <p:cNvPr id="40" name="Title 1">
+            <a:extLst>
+              <a:ext uri="{FF2B5EF4-FFF2-40B4-BE49-F238E27FC236}">
+                <a16:creationId xmlns:a16="http://schemas.microsoft.com/office/drawing/2014/main" id="{DA899C8D-0D00-41FE-AC7B-4990ACC76F58}"/>
+              </a:ext>
+            </a:extLst>
+          </p:cNvPr>
+          <p:cNvSpPr txBox="1">
+            <a:spLocks/>
+          </p:cNvSpPr>
+          <p:nvPr/>
+        </p:nvSpPr>
+        <p:spPr>
+          <a:xfrm>
+            <a:off x="7020473" y="4233847"/>
+            <a:ext cx="4854747" cy="565944"/>
+          </a:xfrm>
+          <a:prstGeom prst="rect">
+            <a:avLst/>
+          </a:prstGeom>
+        </p:spPr>
+        <p:txBody>
+          <a:bodyPr vert="horz" lIns="91440" tIns="45720" rIns="91440" bIns="45720" rtlCol="0" anchor="ctr">
+            <a:normAutofit/>
+          </a:bodyPr>
+          <a:lstStyle>
+            <a:lvl1pPr algn="l" defTabSz="914400" rtl="0" eaLnBrk="1" latinLnBrk="0" hangingPunct="1">
+              <a:lnSpc>
+                <a:spcPct val="90000"/>
+              </a:lnSpc>
+              <a:spcBef>
+                <a:spcPct val="0"/>
+              </a:spcBef>
+              <a:buNone/>
+              <a:defRPr sz="4400" kern="1200">
+                <a:solidFill>
+                  <a:schemeClr val="tx1"/>
+                </a:solidFill>
+                <a:latin typeface="+mj-lt"/>
+                <a:ea typeface="+mj-ea"/>
+                <a:cs typeface="+mj-cs"/>
+              </a:defRPr>
+            </a:lvl1pPr>
+          </a:lstStyle>
+          <a:p>
+            <a:r>
+              <a:rPr lang="ru-RU" sz="1400" b="1" i="1" dirty="0">
+                <a:latin typeface="+mn-lt"/>
+              </a:rPr>
+              <a:t>Решение 2</a:t>
+            </a:r>
+            <a:endParaRPr lang="en-US" sz="1400" b="1" i="1" dirty="0">
+              <a:latin typeface="+mn-lt"/>
+            </a:endParaRPr>
+          </a:p>
+        </p:txBody>
+      </p:sp>
+      <p:sp>
+        <p:nvSpPr>
+          <p:cNvPr id="41" name="Title 1">
+            <a:extLst>
+              <a:ext uri="{FF2B5EF4-FFF2-40B4-BE49-F238E27FC236}">
+                <a16:creationId xmlns:a16="http://schemas.microsoft.com/office/drawing/2014/main" id="{0BEC74AA-5D15-41F9-84C4-8B4283C8C05F}"/>
+              </a:ext>
+            </a:extLst>
+          </p:cNvPr>
+          <p:cNvSpPr txBox="1">
+            <a:spLocks/>
+          </p:cNvSpPr>
+          <p:nvPr/>
+        </p:nvSpPr>
+        <p:spPr>
+          <a:xfrm>
+            <a:off x="2936703" y="228278"/>
+            <a:ext cx="4854747" cy="565944"/>
+          </a:xfrm>
+          <a:prstGeom prst="rect">
+            <a:avLst/>
+          </a:prstGeom>
+        </p:spPr>
+        <p:txBody>
+          <a:bodyPr vert="horz" lIns="91440" tIns="45720" rIns="91440" bIns="45720" rtlCol="0" anchor="ctr">
+            <a:normAutofit/>
+          </a:bodyPr>
+          <a:lstStyle>
+            <a:lvl1pPr algn="l" defTabSz="914400" rtl="0" eaLnBrk="1" latinLnBrk="0" hangingPunct="1">
+              <a:lnSpc>
+                <a:spcPct val="90000"/>
+              </a:lnSpc>
+              <a:spcBef>
+                <a:spcPct val="0"/>
+              </a:spcBef>
+              <a:buNone/>
+              <a:defRPr sz="4400" kern="1200">
+                <a:solidFill>
+                  <a:schemeClr val="tx1"/>
+                </a:solidFill>
+                <a:latin typeface="+mj-lt"/>
+                <a:ea typeface="+mj-ea"/>
+                <a:cs typeface="+mj-cs"/>
+              </a:defRPr>
+            </a:lvl1pPr>
+          </a:lstStyle>
+          <a:p>
+            <a:r>
+              <a:rPr lang="ru-RU" sz="1400" b="1" i="1" dirty="0">
+                <a:latin typeface="+mn-lt"/>
+              </a:rPr>
+              <a:t>Решение 1</a:t>
+            </a:r>
+            <a:endParaRPr lang="en-US" sz="1400" b="1" i="1" dirty="0">
+              <a:latin typeface="+mn-lt"/>
+            </a:endParaRPr>
+          </a:p>
+        </p:txBody>
+      </p:sp>
+    </p:spTree>
+    <p:extLst>
+      <p:ext uri="{BB962C8B-B14F-4D97-AF65-F5344CB8AC3E}">
+        <p14:creationId xmlns:p14="http://schemas.microsoft.com/office/powerpoint/2010/main" val="1633615213"/>
       </p:ext>
     </p:extLst>
   </p:cSld>

</xml_diff>